<commit_message>
adding a slide at the begging
</commit_message>
<xml_diff>
--- a/Mammy-Yummy!.pptx
+++ b/Mammy-Yummy!.pptx
@@ -5,21 +5,22 @@
     <p:sldMasterId id="2147483648" r:id="rId1"/>
   </p:sldMasterIdLst>
   <p:sldIdLst>
-    <p:sldId id="256" r:id="rId2"/>
-    <p:sldId id="257" r:id="rId3"/>
-    <p:sldId id="258" r:id="rId4"/>
-    <p:sldId id="259" r:id="rId5"/>
-    <p:sldId id="260" r:id="rId6"/>
-    <p:sldId id="263" r:id="rId7"/>
-    <p:sldId id="269" r:id="rId8"/>
-    <p:sldId id="261" r:id="rId9"/>
-    <p:sldId id="262" r:id="rId10"/>
-    <p:sldId id="265" r:id="rId11"/>
-    <p:sldId id="264" r:id="rId12"/>
-    <p:sldId id="266" r:id="rId13"/>
-    <p:sldId id="267" r:id="rId14"/>
-    <p:sldId id="268" r:id="rId15"/>
-    <p:sldId id="271" r:id="rId16"/>
+    <p:sldId id="272" r:id="rId2"/>
+    <p:sldId id="256" r:id="rId3"/>
+    <p:sldId id="257" r:id="rId4"/>
+    <p:sldId id="258" r:id="rId5"/>
+    <p:sldId id="259" r:id="rId6"/>
+    <p:sldId id="260" r:id="rId7"/>
+    <p:sldId id="263" r:id="rId8"/>
+    <p:sldId id="269" r:id="rId9"/>
+    <p:sldId id="261" r:id="rId10"/>
+    <p:sldId id="262" r:id="rId11"/>
+    <p:sldId id="265" r:id="rId12"/>
+    <p:sldId id="264" r:id="rId13"/>
+    <p:sldId id="266" r:id="rId14"/>
+    <p:sldId id="267" r:id="rId15"/>
+    <p:sldId id="268" r:id="rId16"/>
+    <p:sldId id="271" r:id="rId17"/>
   </p:sldIdLst>
   <p:sldSz cx="12192000" cy="6858000"/>
   <p:notesSz cx="6858000" cy="9144000"/>
@@ -7761,7 +7762,7 @@
           <a:p>
             <a:fld id="{9CF8EC0C-3B7C-44A3-95D0-B247D55FFE67}" type="datetimeFigureOut">
               <a:rPr lang="en-US" smtClean="0"/>
-              <a:t>12/22/2020</a:t>
+              <a:t>12/23/2020</a:t>
             </a:fld>
             <a:endParaRPr lang="en-US"/>
           </a:p>
@@ -7959,7 +7960,7 @@
           <a:p>
             <a:fld id="{9CF8EC0C-3B7C-44A3-95D0-B247D55FFE67}" type="datetimeFigureOut">
               <a:rPr lang="en-US" smtClean="0"/>
-              <a:t>12/22/2020</a:t>
+              <a:t>12/23/2020</a:t>
             </a:fld>
             <a:endParaRPr lang="en-US"/>
           </a:p>
@@ -8167,7 +8168,7 @@
           <a:p>
             <a:fld id="{9CF8EC0C-3B7C-44A3-95D0-B247D55FFE67}" type="datetimeFigureOut">
               <a:rPr lang="en-US" smtClean="0"/>
-              <a:t>12/22/2020</a:t>
+              <a:t>12/23/2020</a:t>
             </a:fld>
             <a:endParaRPr lang="en-US"/>
           </a:p>
@@ -8365,7 +8366,7 @@
           <a:p>
             <a:fld id="{9CF8EC0C-3B7C-44A3-95D0-B247D55FFE67}" type="datetimeFigureOut">
               <a:rPr lang="en-US" smtClean="0"/>
-              <a:t>12/22/2020</a:t>
+              <a:t>12/23/2020</a:t>
             </a:fld>
             <a:endParaRPr lang="en-US"/>
           </a:p>
@@ -8640,7 +8641,7 @@
           <a:p>
             <a:fld id="{9CF8EC0C-3B7C-44A3-95D0-B247D55FFE67}" type="datetimeFigureOut">
               <a:rPr lang="en-US" smtClean="0"/>
-              <a:t>12/22/2020</a:t>
+              <a:t>12/23/2020</a:t>
             </a:fld>
             <a:endParaRPr lang="en-US"/>
           </a:p>
@@ -8905,7 +8906,7 @@
           <a:p>
             <a:fld id="{9CF8EC0C-3B7C-44A3-95D0-B247D55FFE67}" type="datetimeFigureOut">
               <a:rPr lang="en-US" smtClean="0"/>
-              <a:t>12/22/2020</a:t>
+              <a:t>12/23/2020</a:t>
             </a:fld>
             <a:endParaRPr lang="en-US"/>
           </a:p>
@@ -9317,7 +9318,7 @@
           <a:p>
             <a:fld id="{9CF8EC0C-3B7C-44A3-95D0-B247D55FFE67}" type="datetimeFigureOut">
               <a:rPr lang="en-US" smtClean="0"/>
-              <a:t>12/22/2020</a:t>
+              <a:t>12/23/2020</a:t>
             </a:fld>
             <a:endParaRPr lang="en-US"/>
           </a:p>
@@ -9458,7 +9459,7 @@
           <a:p>
             <a:fld id="{9CF8EC0C-3B7C-44A3-95D0-B247D55FFE67}" type="datetimeFigureOut">
               <a:rPr lang="en-US" smtClean="0"/>
-              <a:t>12/22/2020</a:t>
+              <a:t>12/23/2020</a:t>
             </a:fld>
             <a:endParaRPr lang="en-US"/>
           </a:p>
@@ -9571,7 +9572,7 @@
           <a:p>
             <a:fld id="{9CF8EC0C-3B7C-44A3-95D0-B247D55FFE67}" type="datetimeFigureOut">
               <a:rPr lang="en-US" smtClean="0"/>
-              <a:t>12/22/2020</a:t>
+              <a:t>12/23/2020</a:t>
             </a:fld>
             <a:endParaRPr lang="en-US"/>
           </a:p>
@@ -9882,7 +9883,7 @@
           <a:p>
             <a:fld id="{9CF8EC0C-3B7C-44A3-95D0-B247D55FFE67}" type="datetimeFigureOut">
               <a:rPr lang="en-US" smtClean="0"/>
-              <a:t>12/22/2020</a:t>
+              <a:t>12/23/2020</a:t>
             </a:fld>
             <a:endParaRPr lang="en-US"/>
           </a:p>
@@ -10170,7 +10171,7 @@
           <a:p>
             <a:fld id="{9CF8EC0C-3B7C-44A3-95D0-B247D55FFE67}" type="datetimeFigureOut">
               <a:rPr lang="en-US" smtClean="0"/>
-              <a:t>12/22/2020</a:t>
+              <a:t>12/23/2020</a:t>
             </a:fld>
             <a:endParaRPr lang="en-US"/>
           </a:p>
@@ -10411,7 +10412,7 @@
           <a:p>
             <a:fld id="{9CF8EC0C-3B7C-44A3-95D0-B247D55FFE67}" type="datetimeFigureOut">
               <a:rPr lang="en-US" smtClean="0"/>
-              <a:t>12/22/2020</a:t>
+              <a:t>12/23/2020</a:t>
             </a:fld>
             <a:endParaRPr lang="en-US"/>
           </a:p>
@@ -10833,6 +10834,1011 @@
           <p:cNvPr id="2" name="Title 1">
             <a:extLst>
               <a:ext uri="{FF2B5EF4-FFF2-40B4-BE49-F238E27FC236}">
+                <a16:creationId xmlns:a16="http://schemas.microsoft.com/office/drawing/2014/main" id="{8A0BCCB1-3FDF-4441-B3E6-A5C99A588540}"/>
+              </a:ext>
+            </a:extLst>
+          </p:cNvPr>
+          <p:cNvSpPr>
+            <a:spLocks noGrp="1"/>
+          </p:cNvSpPr>
+          <p:nvPr>
+            <p:ph type="title"/>
+          </p:nvPr>
+        </p:nvSpPr>
+        <p:spPr/>
+        <p:txBody>
+          <a:bodyPr/>
+          <a:lstStyle/>
+          <a:p>
+            <a:r>
+              <a:rPr lang="en-US" dirty="0"/>
+              <a:t>Project </a:t>
+            </a:r>
+          </a:p>
+        </p:txBody>
+      </p:sp>
+      <p:sp>
+        <p:nvSpPr>
+          <p:cNvPr id="3" name="Content Placeholder 2">
+            <a:extLst>
+              <a:ext uri="{FF2B5EF4-FFF2-40B4-BE49-F238E27FC236}">
+                <a16:creationId xmlns:a16="http://schemas.microsoft.com/office/drawing/2014/main" id="{005758B4-D188-4635-9A4E-CF7073AF29E2}"/>
+              </a:ext>
+            </a:extLst>
+          </p:cNvPr>
+          <p:cNvSpPr>
+            <a:spLocks noGrp="1"/>
+          </p:cNvSpPr>
+          <p:nvPr>
+            <p:ph idx="1"/>
+          </p:nvPr>
+        </p:nvSpPr>
+        <p:spPr/>
+        <p:txBody>
+          <a:bodyPr/>
+          <a:lstStyle/>
+          <a:p>
+            <a:r>
+              <a:rPr lang="en-US" dirty="0"/>
+              <a:t>And yes</a:t>
+            </a:r>
+          </a:p>
+        </p:txBody>
+      </p:sp>
+    </p:spTree>
+    <p:extLst>
+      <p:ext uri="{BB962C8B-B14F-4D97-AF65-F5344CB8AC3E}">
+        <p14:creationId xmlns:p14="http://schemas.microsoft.com/office/powerpoint/2010/main" val="939821374"/>
+      </p:ext>
+    </p:extLst>
+  </p:cSld>
+  <p:clrMapOvr>
+    <a:masterClrMapping/>
+  </p:clrMapOvr>
+</p:sld>
+</file>
+
+<file path=ppt/slides/slide10.xml><?xml version="1.0" encoding="utf-8"?>
+<p:sld xmlns:a="http://schemas.openxmlformats.org/drawingml/2006/main" xmlns:r="http://schemas.openxmlformats.org/officeDocument/2006/relationships" xmlns:p="http://schemas.openxmlformats.org/presentationml/2006/main">
+  <p:cSld>
+    <p:spTree>
+      <p:nvGrpSpPr>
+        <p:cNvPr id="1" name=""/>
+        <p:cNvGrpSpPr/>
+        <p:nvPr/>
+      </p:nvGrpSpPr>
+      <p:grpSpPr>
+        <a:xfrm>
+          <a:off x="0" y="0"/>
+          <a:ext cx="0" cy="0"/>
+          <a:chOff x="0" y="0"/>
+          <a:chExt cx="0" cy="0"/>
+        </a:xfrm>
+      </p:grpSpPr>
+      <p:sp>
+        <p:nvSpPr>
+          <p:cNvPr id="2" name="Title 1">
+            <a:extLst>
+              <a:ext uri="{FF2B5EF4-FFF2-40B4-BE49-F238E27FC236}">
+                <a16:creationId xmlns:a16="http://schemas.microsoft.com/office/drawing/2014/main" id="{14E9B6F6-46E4-4248-AA02-2742A961F49B}"/>
+              </a:ext>
+            </a:extLst>
+          </p:cNvPr>
+          <p:cNvSpPr>
+            <a:spLocks noGrp="1"/>
+          </p:cNvSpPr>
+          <p:nvPr>
+            <p:ph type="title"/>
+          </p:nvPr>
+        </p:nvSpPr>
+        <p:spPr/>
+        <p:txBody>
+          <a:bodyPr/>
+          <a:lstStyle/>
+          <a:p>
+            <a:r>
+              <a:rPr lang="en-US" dirty="0"/>
+              <a:t>JOB DESCRIPTION </a:t>
+            </a:r>
+          </a:p>
+        </p:txBody>
+      </p:sp>
+      <p:sp>
+        <p:nvSpPr>
+          <p:cNvPr id="3" name="Content Placeholder 2">
+            <a:extLst>
+              <a:ext uri="{FF2B5EF4-FFF2-40B4-BE49-F238E27FC236}">
+                <a16:creationId xmlns:a16="http://schemas.microsoft.com/office/drawing/2014/main" id="{E4F25FBA-0D5A-429B-AB79-12CDC07A6A03}"/>
+              </a:ext>
+            </a:extLst>
+          </p:cNvPr>
+          <p:cNvSpPr>
+            <a:spLocks noGrp="1"/>
+          </p:cNvSpPr>
+          <p:nvPr>
+            <p:ph idx="1"/>
+          </p:nvPr>
+        </p:nvSpPr>
+        <p:spPr/>
+        <p:txBody>
+          <a:bodyPr>
+            <a:normAutofit/>
+          </a:bodyPr>
+          <a:lstStyle/>
+          <a:p>
+            <a:r>
+              <a:rPr lang="en-US" dirty="0"/>
+              <a:t>Financial Manager:</a:t>
+            </a:r>
+          </a:p>
+          <a:p>
+            <a:pPr marL="0" indent="0">
+              <a:buNone/>
+            </a:pPr>
+            <a:endParaRPr lang="en-US" dirty="0"/>
+          </a:p>
+          <a:p>
+            <a:pPr lvl="1" fontAlgn="base"/>
+            <a:r>
+              <a:rPr lang="en-US" dirty="0"/>
+              <a:t>Plan and implement the overall financial strategy.</a:t>
+            </a:r>
+          </a:p>
+          <a:p>
+            <a:pPr lvl="1" fontAlgn="base"/>
+            <a:r>
+              <a:rPr lang="en-US" dirty="0"/>
+              <a:t>Undertaking strategic analysis and assisting with strategic planning </a:t>
+            </a:r>
+          </a:p>
+          <a:p>
+            <a:pPr lvl="1" fontAlgn="base"/>
+            <a:r>
+              <a:rPr lang="en-US" dirty="0"/>
+              <a:t>controlling income, cash flow and expenditure.</a:t>
+            </a:r>
+          </a:p>
+          <a:p>
+            <a:pPr lvl="1" fontAlgn="base"/>
+            <a:r>
+              <a:rPr lang="en-US" dirty="0"/>
+              <a:t>developing and managing financial systems/models</a:t>
+            </a:r>
+          </a:p>
+          <a:p>
+            <a:pPr lvl="1" fontAlgn="base"/>
+            <a:r>
+              <a:rPr lang="en-US" dirty="0"/>
+              <a:t>managing budgets.</a:t>
+            </a:r>
+          </a:p>
+          <a:p>
+            <a:pPr lvl="1" fontAlgn="base"/>
+            <a:r>
+              <a:rPr lang="en-US" dirty="0"/>
+              <a:t>Lead financial team to achieve plans</a:t>
+            </a:r>
+          </a:p>
+          <a:p>
+            <a:pPr lvl="1" fontAlgn="base"/>
+            <a:r>
+              <a:rPr lang="en-US" dirty="0"/>
+              <a:t>Reports to general manager.</a:t>
+            </a:r>
+          </a:p>
+          <a:p>
+            <a:pPr marL="457200" lvl="1" indent="0">
+              <a:buNone/>
+            </a:pPr>
+            <a:endParaRPr lang="en-US" dirty="0"/>
+          </a:p>
+          <a:p>
+            <a:pPr lvl="1"/>
+            <a:endParaRPr lang="en-US" dirty="0"/>
+          </a:p>
+        </p:txBody>
+      </p:sp>
+    </p:spTree>
+    <p:extLst>
+      <p:ext uri="{BB962C8B-B14F-4D97-AF65-F5344CB8AC3E}">
+        <p14:creationId xmlns:p14="http://schemas.microsoft.com/office/powerpoint/2010/main" val="684051136"/>
+      </p:ext>
+    </p:extLst>
+  </p:cSld>
+  <p:clrMapOvr>
+    <a:masterClrMapping/>
+  </p:clrMapOvr>
+</p:sld>
+</file>
+
+<file path=ppt/slides/slide11.xml><?xml version="1.0" encoding="utf-8"?>
+<p:sld xmlns:a="http://schemas.openxmlformats.org/drawingml/2006/main" xmlns:r="http://schemas.openxmlformats.org/officeDocument/2006/relationships" xmlns:p="http://schemas.openxmlformats.org/presentationml/2006/main">
+  <p:cSld>
+    <p:spTree>
+      <p:nvGrpSpPr>
+        <p:cNvPr id="1" name=""/>
+        <p:cNvGrpSpPr/>
+        <p:nvPr/>
+      </p:nvGrpSpPr>
+      <p:grpSpPr>
+        <a:xfrm>
+          <a:off x="0" y="0"/>
+          <a:ext cx="0" cy="0"/>
+          <a:chOff x="0" y="0"/>
+          <a:chExt cx="0" cy="0"/>
+        </a:xfrm>
+      </p:grpSpPr>
+      <p:sp>
+        <p:nvSpPr>
+          <p:cNvPr id="2" name="Title 1">
+            <a:extLst>
+              <a:ext uri="{FF2B5EF4-FFF2-40B4-BE49-F238E27FC236}">
+                <a16:creationId xmlns:a16="http://schemas.microsoft.com/office/drawing/2014/main" id="{14E9B6F6-46E4-4248-AA02-2742A961F49B}"/>
+              </a:ext>
+            </a:extLst>
+          </p:cNvPr>
+          <p:cNvSpPr>
+            <a:spLocks noGrp="1"/>
+          </p:cNvSpPr>
+          <p:nvPr>
+            <p:ph type="title"/>
+          </p:nvPr>
+        </p:nvSpPr>
+        <p:spPr/>
+        <p:txBody>
+          <a:bodyPr/>
+          <a:lstStyle/>
+          <a:p>
+            <a:r>
+              <a:rPr lang="en-US" dirty="0"/>
+              <a:t>JOB DESCRIPTION </a:t>
+            </a:r>
+          </a:p>
+        </p:txBody>
+      </p:sp>
+      <p:sp>
+        <p:nvSpPr>
+          <p:cNvPr id="3" name="Content Placeholder 2">
+            <a:extLst>
+              <a:ext uri="{FF2B5EF4-FFF2-40B4-BE49-F238E27FC236}">
+                <a16:creationId xmlns:a16="http://schemas.microsoft.com/office/drawing/2014/main" id="{E4F25FBA-0D5A-429B-AB79-12CDC07A6A03}"/>
+              </a:ext>
+            </a:extLst>
+          </p:cNvPr>
+          <p:cNvSpPr>
+            <a:spLocks noGrp="1"/>
+          </p:cNvSpPr>
+          <p:nvPr>
+            <p:ph idx="1"/>
+          </p:nvPr>
+        </p:nvSpPr>
+        <p:spPr/>
+        <p:txBody>
+          <a:bodyPr>
+            <a:normAutofit/>
+          </a:bodyPr>
+          <a:lstStyle/>
+          <a:p>
+            <a:r>
+              <a:rPr lang="en-US" dirty="0"/>
+              <a:t>Accountant:</a:t>
+            </a:r>
+          </a:p>
+          <a:p>
+            <a:pPr lvl="1" fontAlgn="base"/>
+            <a:endParaRPr lang="en-US" dirty="0"/>
+          </a:p>
+          <a:p>
+            <a:pPr lvl="1" fontAlgn="base"/>
+            <a:r>
+              <a:rPr lang="en-US" dirty="0"/>
+              <a:t>preparing accounts and tax returns</a:t>
+            </a:r>
+          </a:p>
+          <a:p>
+            <a:pPr lvl="1" fontAlgn="base"/>
+            <a:r>
+              <a:rPr lang="en-US" dirty="0"/>
+              <a:t>administering payrolls and controlling income and expenditure</a:t>
+            </a:r>
+          </a:p>
+          <a:p>
+            <a:pPr lvl="1" fontAlgn="base"/>
+            <a:r>
+              <a:rPr lang="en-US" dirty="0"/>
+              <a:t>Issue receipts and payment documents</a:t>
+            </a:r>
+          </a:p>
+          <a:p>
+            <a:pPr lvl="1" fontAlgn="base"/>
+            <a:r>
+              <a:rPr lang="en-US" dirty="0"/>
+              <a:t>Reports to Financial manager</a:t>
+            </a:r>
+          </a:p>
+          <a:p>
+            <a:pPr lvl="1"/>
+            <a:endParaRPr lang="en-US" dirty="0"/>
+          </a:p>
+        </p:txBody>
+      </p:sp>
+    </p:spTree>
+    <p:extLst>
+      <p:ext uri="{BB962C8B-B14F-4D97-AF65-F5344CB8AC3E}">
+        <p14:creationId xmlns:p14="http://schemas.microsoft.com/office/powerpoint/2010/main" val="3769216246"/>
+      </p:ext>
+    </p:extLst>
+  </p:cSld>
+  <p:clrMapOvr>
+    <a:masterClrMapping/>
+  </p:clrMapOvr>
+</p:sld>
+</file>
+
+<file path=ppt/slides/slide12.xml><?xml version="1.0" encoding="utf-8"?>
+<p:sld xmlns:a="http://schemas.openxmlformats.org/drawingml/2006/main" xmlns:r="http://schemas.openxmlformats.org/officeDocument/2006/relationships" xmlns:p="http://schemas.openxmlformats.org/presentationml/2006/main">
+  <p:cSld>
+    <p:spTree>
+      <p:nvGrpSpPr>
+        <p:cNvPr id="1" name=""/>
+        <p:cNvGrpSpPr/>
+        <p:nvPr/>
+      </p:nvGrpSpPr>
+      <p:grpSpPr>
+        <a:xfrm>
+          <a:off x="0" y="0"/>
+          <a:ext cx="0" cy="0"/>
+          <a:chOff x="0" y="0"/>
+          <a:chExt cx="0" cy="0"/>
+        </a:xfrm>
+      </p:grpSpPr>
+      <p:sp>
+        <p:nvSpPr>
+          <p:cNvPr id="2" name="Title 1">
+            <a:extLst>
+              <a:ext uri="{FF2B5EF4-FFF2-40B4-BE49-F238E27FC236}">
+                <a16:creationId xmlns:a16="http://schemas.microsoft.com/office/drawing/2014/main" id="{14E9B6F6-46E4-4248-AA02-2742A961F49B}"/>
+              </a:ext>
+            </a:extLst>
+          </p:cNvPr>
+          <p:cNvSpPr>
+            <a:spLocks noGrp="1"/>
+          </p:cNvSpPr>
+          <p:nvPr>
+            <p:ph type="title"/>
+          </p:nvPr>
+        </p:nvSpPr>
+        <p:spPr/>
+        <p:txBody>
+          <a:bodyPr/>
+          <a:lstStyle/>
+          <a:p>
+            <a:r>
+              <a:rPr lang="en-US" dirty="0"/>
+              <a:t>JOB DESCRIPTION </a:t>
+            </a:r>
+          </a:p>
+        </p:txBody>
+      </p:sp>
+      <p:sp>
+        <p:nvSpPr>
+          <p:cNvPr id="3" name="Content Placeholder 2">
+            <a:extLst>
+              <a:ext uri="{FF2B5EF4-FFF2-40B4-BE49-F238E27FC236}">
+                <a16:creationId xmlns:a16="http://schemas.microsoft.com/office/drawing/2014/main" id="{E4F25FBA-0D5A-429B-AB79-12CDC07A6A03}"/>
+              </a:ext>
+            </a:extLst>
+          </p:cNvPr>
+          <p:cNvSpPr>
+            <a:spLocks noGrp="1"/>
+          </p:cNvSpPr>
+          <p:nvPr>
+            <p:ph idx="1"/>
+          </p:nvPr>
+        </p:nvSpPr>
+        <p:spPr/>
+        <p:txBody>
+          <a:bodyPr>
+            <a:normAutofit/>
+          </a:bodyPr>
+          <a:lstStyle/>
+          <a:p>
+            <a:r>
+              <a:rPr lang="en-US" dirty="0"/>
+              <a:t>HR Manger:</a:t>
+            </a:r>
+          </a:p>
+          <a:p>
+            <a:pPr marL="0" indent="0">
+              <a:buNone/>
+            </a:pPr>
+            <a:endParaRPr lang="en-US" dirty="0"/>
+          </a:p>
+          <a:p>
+            <a:pPr lvl="1" fontAlgn="base"/>
+            <a:r>
+              <a:rPr lang="en-US" dirty="0"/>
+              <a:t>Recruits, interviews, hires, and trains new staff in the company.</a:t>
+            </a:r>
+          </a:p>
+          <a:p>
+            <a:pPr lvl="1" fontAlgn="base"/>
+            <a:r>
+              <a:rPr lang="en-US" dirty="0"/>
+              <a:t>Oversees the daily workflow of the company.</a:t>
+            </a:r>
+          </a:p>
+          <a:p>
+            <a:pPr lvl="1" fontAlgn="base"/>
+            <a:r>
+              <a:rPr lang="en-US" dirty="0"/>
+              <a:t>Provides constructive and timely performance evaluations.</a:t>
+            </a:r>
+          </a:p>
+          <a:p>
+            <a:pPr lvl="1" fontAlgn="base"/>
+            <a:r>
+              <a:rPr lang="en-US" dirty="0"/>
+              <a:t>Handles discipline and termination of employees in accordance with company policy.</a:t>
+            </a:r>
+          </a:p>
+          <a:p>
+            <a:pPr lvl="1" fontAlgn="base"/>
+            <a:r>
+              <a:rPr lang="en-US" dirty="0"/>
+              <a:t>Reports to general manager</a:t>
+            </a:r>
+          </a:p>
+          <a:p>
+            <a:pPr lvl="1"/>
+            <a:endParaRPr lang="en-US" dirty="0"/>
+          </a:p>
+        </p:txBody>
+      </p:sp>
+    </p:spTree>
+    <p:extLst>
+      <p:ext uri="{BB962C8B-B14F-4D97-AF65-F5344CB8AC3E}">
+        <p14:creationId xmlns:p14="http://schemas.microsoft.com/office/powerpoint/2010/main" val="909828830"/>
+      </p:ext>
+    </p:extLst>
+  </p:cSld>
+  <p:clrMapOvr>
+    <a:masterClrMapping/>
+  </p:clrMapOvr>
+</p:sld>
+</file>
+
+<file path=ppt/slides/slide13.xml><?xml version="1.0" encoding="utf-8"?>
+<p:sld xmlns:a="http://schemas.openxmlformats.org/drawingml/2006/main" xmlns:r="http://schemas.openxmlformats.org/officeDocument/2006/relationships" xmlns:p="http://schemas.openxmlformats.org/presentationml/2006/main">
+  <p:cSld>
+    <p:spTree>
+      <p:nvGrpSpPr>
+        <p:cNvPr id="1" name=""/>
+        <p:cNvGrpSpPr/>
+        <p:nvPr/>
+      </p:nvGrpSpPr>
+      <p:grpSpPr>
+        <a:xfrm>
+          <a:off x="0" y="0"/>
+          <a:ext cx="0" cy="0"/>
+          <a:chOff x="0" y="0"/>
+          <a:chExt cx="0" cy="0"/>
+        </a:xfrm>
+      </p:grpSpPr>
+      <p:sp>
+        <p:nvSpPr>
+          <p:cNvPr id="2" name="Title 1">
+            <a:extLst>
+              <a:ext uri="{FF2B5EF4-FFF2-40B4-BE49-F238E27FC236}">
+                <a16:creationId xmlns:a16="http://schemas.microsoft.com/office/drawing/2014/main" id="{14E9B6F6-46E4-4248-AA02-2742A961F49B}"/>
+              </a:ext>
+            </a:extLst>
+          </p:cNvPr>
+          <p:cNvSpPr>
+            <a:spLocks noGrp="1"/>
+          </p:cNvSpPr>
+          <p:nvPr>
+            <p:ph type="title"/>
+          </p:nvPr>
+        </p:nvSpPr>
+        <p:spPr/>
+        <p:txBody>
+          <a:bodyPr/>
+          <a:lstStyle/>
+          <a:p>
+            <a:r>
+              <a:rPr lang="en-US" dirty="0"/>
+              <a:t>JOB DESCRIPTION </a:t>
+            </a:r>
+          </a:p>
+        </p:txBody>
+      </p:sp>
+      <p:sp>
+        <p:nvSpPr>
+          <p:cNvPr id="3" name="Content Placeholder 2">
+            <a:extLst>
+              <a:ext uri="{FF2B5EF4-FFF2-40B4-BE49-F238E27FC236}">
+                <a16:creationId xmlns:a16="http://schemas.microsoft.com/office/drawing/2014/main" id="{E4F25FBA-0D5A-429B-AB79-12CDC07A6A03}"/>
+              </a:ext>
+            </a:extLst>
+          </p:cNvPr>
+          <p:cNvSpPr>
+            <a:spLocks noGrp="1"/>
+          </p:cNvSpPr>
+          <p:nvPr>
+            <p:ph idx="1"/>
+          </p:nvPr>
+        </p:nvSpPr>
+        <p:spPr/>
+        <p:txBody>
+          <a:bodyPr>
+            <a:normAutofit/>
+          </a:bodyPr>
+          <a:lstStyle/>
+          <a:p>
+            <a:r>
+              <a:rPr lang="en-US" dirty="0"/>
+              <a:t>Customer care:</a:t>
+            </a:r>
+          </a:p>
+          <a:p>
+            <a:pPr lvl="1" fontAlgn="base"/>
+            <a:endParaRPr lang="en-US" dirty="0"/>
+          </a:p>
+          <a:p>
+            <a:pPr lvl="1"/>
+            <a:r>
+              <a:rPr lang="en-US" dirty="0"/>
+              <a:t>Providing customers with what they want</a:t>
+            </a:r>
+          </a:p>
+          <a:p>
+            <a:pPr lvl="1"/>
+            <a:r>
+              <a:rPr lang="en-US" dirty="0"/>
+              <a:t>Offering consistent levels of service</a:t>
+            </a:r>
+          </a:p>
+          <a:p>
+            <a:pPr lvl="1"/>
+            <a:r>
+              <a:rPr lang="en-US" dirty="0"/>
+              <a:t>Exceeding and not just meeting expectations of our customers</a:t>
+            </a:r>
+          </a:p>
+          <a:p>
+            <a:pPr lvl="1"/>
+            <a:r>
+              <a:rPr lang="en-US" dirty="0"/>
+              <a:t>Answering and provide solutions to customers’ concerns about our products</a:t>
+            </a:r>
+          </a:p>
+          <a:p>
+            <a:pPr lvl="1"/>
+            <a:r>
+              <a:rPr lang="en-US" dirty="0"/>
+              <a:t>Going out of your way to delight customers. </a:t>
+            </a:r>
+          </a:p>
+          <a:p>
+            <a:pPr lvl="1"/>
+            <a:r>
+              <a:rPr lang="en-US" dirty="0"/>
+              <a:t>Report issues and complaint to the marketing manager.</a:t>
+            </a:r>
+          </a:p>
+        </p:txBody>
+      </p:sp>
+    </p:spTree>
+    <p:extLst>
+      <p:ext uri="{BB962C8B-B14F-4D97-AF65-F5344CB8AC3E}">
+        <p14:creationId xmlns:p14="http://schemas.microsoft.com/office/powerpoint/2010/main" val="3820423698"/>
+      </p:ext>
+    </p:extLst>
+  </p:cSld>
+  <p:clrMapOvr>
+    <a:masterClrMapping/>
+  </p:clrMapOvr>
+</p:sld>
+</file>
+
+<file path=ppt/slides/slide14.xml><?xml version="1.0" encoding="utf-8"?>
+<p:sld xmlns:a="http://schemas.openxmlformats.org/drawingml/2006/main" xmlns:r="http://schemas.openxmlformats.org/officeDocument/2006/relationships" xmlns:p="http://schemas.openxmlformats.org/presentationml/2006/main">
+  <p:cSld>
+    <p:spTree>
+      <p:nvGrpSpPr>
+        <p:cNvPr id="1" name=""/>
+        <p:cNvGrpSpPr/>
+        <p:nvPr/>
+      </p:nvGrpSpPr>
+      <p:grpSpPr>
+        <a:xfrm>
+          <a:off x="0" y="0"/>
+          <a:ext cx="0" cy="0"/>
+          <a:chOff x="0" y="0"/>
+          <a:chExt cx="0" cy="0"/>
+        </a:xfrm>
+      </p:grpSpPr>
+      <p:sp>
+        <p:nvSpPr>
+          <p:cNvPr id="2" name="Title 1">
+            <a:extLst>
+              <a:ext uri="{FF2B5EF4-FFF2-40B4-BE49-F238E27FC236}">
+                <a16:creationId xmlns:a16="http://schemas.microsoft.com/office/drawing/2014/main" id="{DA286F5F-E00C-4F88-BDE8-5B594276218B}"/>
+              </a:ext>
+            </a:extLst>
+          </p:cNvPr>
+          <p:cNvSpPr>
+            <a:spLocks noGrp="1"/>
+          </p:cNvSpPr>
+          <p:nvPr>
+            <p:ph type="title"/>
+          </p:nvPr>
+        </p:nvSpPr>
+        <p:spPr/>
+        <p:txBody>
+          <a:bodyPr/>
+          <a:lstStyle/>
+          <a:p>
+            <a:r>
+              <a:rPr lang="en-US" dirty="0"/>
+              <a:t>Three cases have occurred as such</a:t>
+            </a:r>
+          </a:p>
+        </p:txBody>
+      </p:sp>
+      <p:sp>
+        <p:nvSpPr>
+          <p:cNvPr id="3" name="Content Placeholder 2">
+            <a:extLst>
+              <a:ext uri="{FF2B5EF4-FFF2-40B4-BE49-F238E27FC236}">
+                <a16:creationId xmlns:a16="http://schemas.microsoft.com/office/drawing/2014/main" id="{D7AE98F3-6D88-4BC9-82D9-D22737592C5C}"/>
+              </a:ext>
+            </a:extLst>
+          </p:cNvPr>
+          <p:cNvSpPr>
+            <a:spLocks noGrp="1"/>
+          </p:cNvSpPr>
+          <p:nvPr>
+            <p:ph idx="1"/>
+          </p:nvPr>
+        </p:nvSpPr>
+        <p:spPr>
+          <a:xfrm>
+            <a:off x="838200" y="1825625"/>
+            <a:ext cx="10515600" cy="1603375"/>
+          </a:xfrm>
+        </p:spPr>
+        <p:txBody>
+          <a:bodyPr/>
+          <a:lstStyle/>
+          <a:p>
+            <a:r>
+              <a:rPr lang="en-US" dirty="0"/>
+              <a:t>An expired product was found on a sale point</a:t>
+            </a:r>
+          </a:p>
+          <a:p>
+            <a:r>
+              <a:rPr lang="en-US" dirty="0"/>
+              <a:t>A child was poisoned eating Yummy meal.</a:t>
+            </a:r>
+          </a:p>
+          <a:p>
+            <a:r>
+              <a:rPr lang="en-US" dirty="0"/>
+              <a:t>Prices of Goat milk has risen on the market.</a:t>
+            </a:r>
+          </a:p>
+        </p:txBody>
+      </p:sp>
+    </p:spTree>
+    <p:extLst>
+      <p:ext uri="{BB962C8B-B14F-4D97-AF65-F5344CB8AC3E}">
+        <p14:creationId xmlns:p14="http://schemas.microsoft.com/office/powerpoint/2010/main" val="3828211854"/>
+      </p:ext>
+    </p:extLst>
+  </p:cSld>
+  <p:clrMapOvr>
+    <a:masterClrMapping/>
+  </p:clrMapOvr>
+</p:sld>
+</file>
+
+<file path=ppt/slides/slide15.xml><?xml version="1.0" encoding="utf-8"?>
+<p:sld xmlns:a="http://schemas.openxmlformats.org/drawingml/2006/main" xmlns:r="http://schemas.openxmlformats.org/officeDocument/2006/relationships" xmlns:p="http://schemas.openxmlformats.org/presentationml/2006/main">
+  <p:cSld>
+    <p:spTree>
+      <p:nvGrpSpPr>
+        <p:cNvPr id="1" name=""/>
+        <p:cNvGrpSpPr/>
+        <p:nvPr/>
+      </p:nvGrpSpPr>
+      <p:grpSpPr>
+        <a:xfrm>
+          <a:off x="0" y="0"/>
+          <a:ext cx="0" cy="0"/>
+          <a:chOff x="0" y="0"/>
+          <a:chExt cx="0" cy="0"/>
+        </a:xfrm>
+      </p:grpSpPr>
+      <p:sp>
+        <p:nvSpPr>
+          <p:cNvPr id="2" name="Title 1">
+            <a:extLst>
+              <a:ext uri="{FF2B5EF4-FFF2-40B4-BE49-F238E27FC236}">
+                <a16:creationId xmlns:a16="http://schemas.microsoft.com/office/drawing/2014/main" id="{DA286F5F-E00C-4F88-BDE8-5B594276218B}"/>
+              </a:ext>
+            </a:extLst>
+          </p:cNvPr>
+          <p:cNvSpPr>
+            <a:spLocks noGrp="1"/>
+          </p:cNvSpPr>
+          <p:nvPr>
+            <p:ph type="title"/>
+          </p:nvPr>
+        </p:nvSpPr>
+        <p:spPr/>
+        <p:txBody>
+          <a:bodyPr>
+            <a:normAutofit fontScale="90000"/>
+          </a:bodyPr>
+          <a:lstStyle/>
+          <a:p>
+            <a:r>
+              <a:rPr lang="en-US" dirty="0"/>
+              <a:t>Cases 1:</a:t>
+            </a:r>
+            <a:br>
+              <a:rPr lang="en-US" dirty="0"/>
+            </a:br>
+            <a:r>
+              <a:rPr lang="en-US" dirty="0"/>
+              <a:t>An expired product was found on a sale point</a:t>
+            </a:r>
+            <a:br>
+              <a:rPr lang="en-US" dirty="0"/>
+            </a:br>
+            <a:endParaRPr lang="en-US" dirty="0"/>
+          </a:p>
+        </p:txBody>
+      </p:sp>
+      <p:sp>
+        <p:nvSpPr>
+          <p:cNvPr id="3" name="Content Placeholder 2">
+            <a:extLst>
+              <a:ext uri="{FF2B5EF4-FFF2-40B4-BE49-F238E27FC236}">
+                <a16:creationId xmlns:a16="http://schemas.microsoft.com/office/drawing/2014/main" id="{D7AE98F3-6D88-4BC9-82D9-D22737592C5C}"/>
+              </a:ext>
+            </a:extLst>
+          </p:cNvPr>
+          <p:cNvSpPr>
+            <a:spLocks noGrp="1"/>
+          </p:cNvSpPr>
+          <p:nvPr>
+            <p:ph idx="1"/>
+          </p:nvPr>
+        </p:nvSpPr>
+        <p:spPr>
+          <a:xfrm>
+            <a:off x="838200" y="1825624"/>
+            <a:ext cx="10515600" cy="4098657"/>
+          </a:xfrm>
+        </p:spPr>
+        <p:txBody>
+          <a:bodyPr>
+            <a:normAutofit lnSpcReduction="10000"/>
+          </a:bodyPr>
+          <a:lstStyle/>
+          <a:p>
+            <a:r>
+              <a:rPr lang="en-US" dirty="0"/>
+              <a:t>Our customer care received a call from a customer complaining about an expired product on market.</a:t>
+            </a:r>
+          </a:p>
+          <a:p>
+            <a:r>
+              <a:rPr lang="en-US" dirty="0"/>
+              <a:t>Our customer care have reported to the marketing manager.</a:t>
+            </a:r>
+          </a:p>
+          <a:p>
+            <a:r>
+              <a:rPr lang="en-US" dirty="0"/>
+              <a:t>Our sales team check the expired dates of all products, report and replace expired ones.</a:t>
+            </a:r>
+          </a:p>
+          <a:p>
+            <a:r>
+              <a:rPr lang="en-US" dirty="0"/>
+              <a:t>There was no report found regarding an expired product.</a:t>
+            </a:r>
+          </a:p>
+          <a:p>
+            <a:r>
+              <a:rPr lang="en-US" dirty="0"/>
+              <a:t>The marketing manager reports to the supply chain manager.</a:t>
+            </a:r>
+          </a:p>
+          <a:p>
+            <a:r>
+              <a:rPr lang="en-US" dirty="0"/>
+              <a:t>Supply chain manager reports to the general Manager and CC to the legal counsel. </a:t>
+            </a:r>
+          </a:p>
+          <a:p>
+            <a:endParaRPr lang="en-US" dirty="0"/>
+          </a:p>
+          <a:p>
+            <a:endParaRPr lang="en-US" dirty="0"/>
+          </a:p>
+          <a:p>
+            <a:endParaRPr lang="en-US" dirty="0"/>
+          </a:p>
+        </p:txBody>
+      </p:sp>
+    </p:spTree>
+    <p:extLst>
+      <p:ext uri="{BB962C8B-B14F-4D97-AF65-F5344CB8AC3E}">
+        <p14:creationId xmlns:p14="http://schemas.microsoft.com/office/powerpoint/2010/main" val="1188507269"/>
+      </p:ext>
+    </p:extLst>
+  </p:cSld>
+  <p:clrMapOvr>
+    <a:masterClrMapping/>
+  </p:clrMapOvr>
+</p:sld>
+</file>
+
+<file path=ppt/slides/slide16.xml><?xml version="1.0" encoding="utf-8"?>
+<p:sld xmlns:a="http://schemas.openxmlformats.org/drawingml/2006/main" xmlns:r="http://schemas.openxmlformats.org/officeDocument/2006/relationships" xmlns:p="http://schemas.openxmlformats.org/presentationml/2006/main">
+  <p:cSld>
+    <p:spTree>
+      <p:nvGrpSpPr>
+        <p:cNvPr id="1" name=""/>
+        <p:cNvGrpSpPr/>
+        <p:nvPr/>
+      </p:nvGrpSpPr>
+      <p:grpSpPr>
+        <a:xfrm>
+          <a:off x="0" y="0"/>
+          <a:ext cx="0" cy="0"/>
+          <a:chOff x="0" y="0"/>
+          <a:chExt cx="0" cy="0"/>
+        </a:xfrm>
+      </p:grpSpPr>
+      <p:sp>
+        <p:nvSpPr>
+          <p:cNvPr id="2" name="Title 1">
+            <a:extLst>
+              <a:ext uri="{FF2B5EF4-FFF2-40B4-BE49-F238E27FC236}">
+                <a16:creationId xmlns:a16="http://schemas.microsoft.com/office/drawing/2014/main" id="{DA286F5F-E00C-4F88-BDE8-5B594276218B}"/>
+              </a:ext>
+            </a:extLst>
+          </p:cNvPr>
+          <p:cNvSpPr>
+            <a:spLocks noGrp="1"/>
+          </p:cNvSpPr>
+          <p:nvPr>
+            <p:ph type="title"/>
+          </p:nvPr>
+        </p:nvSpPr>
+        <p:spPr/>
+        <p:txBody>
+          <a:bodyPr>
+            <a:normAutofit fontScale="90000"/>
+          </a:bodyPr>
+          <a:lstStyle/>
+          <a:p>
+            <a:r>
+              <a:rPr lang="en-US" dirty="0"/>
+              <a:t>Cases 2:</a:t>
+            </a:r>
+            <a:br>
+              <a:rPr lang="en-US" dirty="0"/>
+            </a:br>
+            <a:r>
+              <a:rPr lang="en-US" dirty="0"/>
+              <a:t>A child was poisoned eating Yummy meal.</a:t>
+            </a:r>
+            <a:br>
+              <a:rPr lang="en-US" dirty="0"/>
+            </a:br>
+            <a:endParaRPr lang="en-US" dirty="0"/>
+          </a:p>
+        </p:txBody>
+      </p:sp>
+      <p:sp>
+        <p:nvSpPr>
+          <p:cNvPr id="3" name="Content Placeholder 2">
+            <a:extLst>
+              <a:ext uri="{FF2B5EF4-FFF2-40B4-BE49-F238E27FC236}">
+                <a16:creationId xmlns:a16="http://schemas.microsoft.com/office/drawing/2014/main" id="{D7AE98F3-6D88-4BC9-82D9-D22737592C5C}"/>
+              </a:ext>
+            </a:extLst>
+          </p:cNvPr>
+          <p:cNvSpPr>
+            <a:spLocks noGrp="1"/>
+          </p:cNvSpPr>
+          <p:nvPr>
+            <p:ph idx="1"/>
+          </p:nvPr>
+        </p:nvSpPr>
+        <p:spPr>
+          <a:xfrm>
+            <a:off x="838200" y="1825625"/>
+            <a:ext cx="10515600" cy="3860800"/>
+          </a:xfrm>
+        </p:spPr>
+        <p:txBody>
+          <a:bodyPr>
+            <a:normAutofit/>
+          </a:bodyPr>
+          <a:lstStyle/>
+          <a:p>
+            <a:r>
+              <a:rPr lang="en-US" dirty="0"/>
+              <a:t>A customer reached our customer care’s office and complained that her child was poisoned by eating a Yummy meal and willing to sue the company.</a:t>
+            </a:r>
+          </a:p>
+          <a:p>
+            <a:r>
+              <a:rPr lang="en-US" dirty="0"/>
+              <a:t>Our customer care told the customer to calm down and have reported the issue to the marketing manager.</a:t>
+            </a:r>
+          </a:p>
+          <a:p>
+            <a:r>
+              <a:rPr lang="en-US" dirty="0"/>
+              <a:t>Marketing manager reports to the supply chain manager.</a:t>
+            </a:r>
+          </a:p>
+          <a:p>
+            <a:r>
+              <a:rPr lang="en-US" dirty="0"/>
+              <a:t> the supply chain manager reports to the general Manager and CC to the legal counsel. </a:t>
+            </a:r>
+          </a:p>
+          <a:p>
+            <a:endParaRPr lang="en-US" dirty="0"/>
+          </a:p>
+        </p:txBody>
+      </p:sp>
+    </p:spTree>
+    <p:extLst>
+      <p:ext uri="{BB962C8B-B14F-4D97-AF65-F5344CB8AC3E}">
+        <p14:creationId xmlns:p14="http://schemas.microsoft.com/office/powerpoint/2010/main" val="896641525"/>
+      </p:ext>
+    </p:extLst>
+  </p:cSld>
+  <p:clrMapOvr>
+    <a:masterClrMapping/>
+  </p:clrMapOvr>
+</p:sld>
+</file>
+
+<file path=ppt/slides/slide2.xml><?xml version="1.0" encoding="utf-8"?>
+<p:sld xmlns:a="http://schemas.openxmlformats.org/drawingml/2006/main" xmlns:r="http://schemas.openxmlformats.org/officeDocument/2006/relationships" xmlns:p="http://schemas.openxmlformats.org/presentationml/2006/main">
+  <p:cSld>
+    <p:spTree>
+      <p:nvGrpSpPr>
+        <p:cNvPr id="1" name=""/>
+        <p:cNvGrpSpPr/>
+        <p:nvPr/>
+      </p:nvGrpSpPr>
+      <p:grpSpPr>
+        <a:xfrm>
+          <a:off x="0" y="0"/>
+          <a:ext cx="0" cy="0"/>
+          <a:chOff x="0" y="0"/>
+          <a:chExt cx="0" cy="0"/>
+        </a:xfrm>
+      </p:grpSpPr>
+      <p:sp>
+        <p:nvSpPr>
+          <p:cNvPr id="2" name="Title 1">
+            <a:extLst>
+              <a:ext uri="{FF2B5EF4-FFF2-40B4-BE49-F238E27FC236}">
                 <a16:creationId xmlns:a16="http://schemas.microsoft.com/office/drawing/2014/main" id="{C48BDDAD-0883-4C0B-870D-43990077F93A}"/>
               </a:ext>
             </a:extLst>
@@ -11117,773 +12123,7 @@
 </p:sld>
 </file>
 
-<file path=ppt/slides/slide10.xml><?xml version="1.0" encoding="utf-8"?>
-<p:sld xmlns:a="http://schemas.openxmlformats.org/drawingml/2006/main" xmlns:r="http://schemas.openxmlformats.org/officeDocument/2006/relationships" xmlns:p="http://schemas.openxmlformats.org/presentationml/2006/main">
-  <p:cSld>
-    <p:spTree>
-      <p:nvGrpSpPr>
-        <p:cNvPr id="1" name=""/>
-        <p:cNvGrpSpPr/>
-        <p:nvPr/>
-      </p:nvGrpSpPr>
-      <p:grpSpPr>
-        <a:xfrm>
-          <a:off x="0" y="0"/>
-          <a:ext cx="0" cy="0"/>
-          <a:chOff x="0" y="0"/>
-          <a:chExt cx="0" cy="0"/>
-        </a:xfrm>
-      </p:grpSpPr>
-      <p:sp>
-        <p:nvSpPr>
-          <p:cNvPr id="2" name="Title 1">
-            <a:extLst>
-              <a:ext uri="{FF2B5EF4-FFF2-40B4-BE49-F238E27FC236}">
-                <a16:creationId xmlns:a16="http://schemas.microsoft.com/office/drawing/2014/main" id="{14E9B6F6-46E4-4248-AA02-2742A961F49B}"/>
-              </a:ext>
-            </a:extLst>
-          </p:cNvPr>
-          <p:cNvSpPr>
-            <a:spLocks noGrp="1"/>
-          </p:cNvSpPr>
-          <p:nvPr>
-            <p:ph type="title"/>
-          </p:nvPr>
-        </p:nvSpPr>
-        <p:spPr/>
-        <p:txBody>
-          <a:bodyPr/>
-          <a:lstStyle/>
-          <a:p>
-            <a:r>
-              <a:rPr lang="en-US" dirty="0"/>
-              <a:t>JOB DESCRIPTION </a:t>
-            </a:r>
-          </a:p>
-        </p:txBody>
-      </p:sp>
-      <p:sp>
-        <p:nvSpPr>
-          <p:cNvPr id="3" name="Content Placeholder 2">
-            <a:extLst>
-              <a:ext uri="{FF2B5EF4-FFF2-40B4-BE49-F238E27FC236}">
-                <a16:creationId xmlns:a16="http://schemas.microsoft.com/office/drawing/2014/main" id="{E4F25FBA-0D5A-429B-AB79-12CDC07A6A03}"/>
-              </a:ext>
-            </a:extLst>
-          </p:cNvPr>
-          <p:cNvSpPr>
-            <a:spLocks noGrp="1"/>
-          </p:cNvSpPr>
-          <p:nvPr>
-            <p:ph idx="1"/>
-          </p:nvPr>
-        </p:nvSpPr>
-        <p:spPr/>
-        <p:txBody>
-          <a:bodyPr>
-            <a:normAutofit/>
-          </a:bodyPr>
-          <a:lstStyle/>
-          <a:p>
-            <a:r>
-              <a:rPr lang="en-US" dirty="0"/>
-              <a:t>Accountant:</a:t>
-            </a:r>
-          </a:p>
-          <a:p>
-            <a:pPr lvl="1" fontAlgn="base"/>
-            <a:endParaRPr lang="en-US" dirty="0"/>
-          </a:p>
-          <a:p>
-            <a:pPr lvl="1" fontAlgn="base"/>
-            <a:r>
-              <a:rPr lang="en-US" dirty="0"/>
-              <a:t>preparing accounts and tax returns</a:t>
-            </a:r>
-          </a:p>
-          <a:p>
-            <a:pPr lvl="1" fontAlgn="base"/>
-            <a:r>
-              <a:rPr lang="en-US" dirty="0"/>
-              <a:t>administering payrolls and controlling income and expenditure</a:t>
-            </a:r>
-          </a:p>
-          <a:p>
-            <a:pPr lvl="1" fontAlgn="base"/>
-            <a:r>
-              <a:rPr lang="en-US" dirty="0"/>
-              <a:t>Issue receipts and payment documents</a:t>
-            </a:r>
-          </a:p>
-          <a:p>
-            <a:pPr lvl="1" fontAlgn="base"/>
-            <a:r>
-              <a:rPr lang="en-US" dirty="0"/>
-              <a:t>Reports to Financial manager</a:t>
-            </a:r>
-          </a:p>
-          <a:p>
-            <a:pPr lvl="1"/>
-            <a:endParaRPr lang="en-US" dirty="0"/>
-          </a:p>
-        </p:txBody>
-      </p:sp>
-    </p:spTree>
-    <p:extLst>
-      <p:ext uri="{BB962C8B-B14F-4D97-AF65-F5344CB8AC3E}">
-        <p14:creationId xmlns:p14="http://schemas.microsoft.com/office/powerpoint/2010/main" val="3769216246"/>
-      </p:ext>
-    </p:extLst>
-  </p:cSld>
-  <p:clrMapOvr>
-    <a:masterClrMapping/>
-  </p:clrMapOvr>
-</p:sld>
-</file>
-
-<file path=ppt/slides/slide11.xml><?xml version="1.0" encoding="utf-8"?>
-<p:sld xmlns:a="http://schemas.openxmlformats.org/drawingml/2006/main" xmlns:r="http://schemas.openxmlformats.org/officeDocument/2006/relationships" xmlns:p="http://schemas.openxmlformats.org/presentationml/2006/main">
-  <p:cSld>
-    <p:spTree>
-      <p:nvGrpSpPr>
-        <p:cNvPr id="1" name=""/>
-        <p:cNvGrpSpPr/>
-        <p:nvPr/>
-      </p:nvGrpSpPr>
-      <p:grpSpPr>
-        <a:xfrm>
-          <a:off x="0" y="0"/>
-          <a:ext cx="0" cy="0"/>
-          <a:chOff x="0" y="0"/>
-          <a:chExt cx="0" cy="0"/>
-        </a:xfrm>
-      </p:grpSpPr>
-      <p:sp>
-        <p:nvSpPr>
-          <p:cNvPr id="2" name="Title 1">
-            <a:extLst>
-              <a:ext uri="{FF2B5EF4-FFF2-40B4-BE49-F238E27FC236}">
-                <a16:creationId xmlns:a16="http://schemas.microsoft.com/office/drawing/2014/main" id="{14E9B6F6-46E4-4248-AA02-2742A961F49B}"/>
-              </a:ext>
-            </a:extLst>
-          </p:cNvPr>
-          <p:cNvSpPr>
-            <a:spLocks noGrp="1"/>
-          </p:cNvSpPr>
-          <p:nvPr>
-            <p:ph type="title"/>
-          </p:nvPr>
-        </p:nvSpPr>
-        <p:spPr/>
-        <p:txBody>
-          <a:bodyPr/>
-          <a:lstStyle/>
-          <a:p>
-            <a:r>
-              <a:rPr lang="en-US" dirty="0"/>
-              <a:t>JOB DESCRIPTION </a:t>
-            </a:r>
-          </a:p>
-        </p:txBody>
-      </p:sp>
-      <p:sp>
-        <p:nvSpPr>
-          <p:cNvPr id="3" name="Content Placeholder 2">
-            <a:extLst>
-              <a:ext uri="{FF2B5EF4-FFF2-40B4-BE49-F238E27FC236}">
-                <a16:creationId xmlns:a16="http://schemas.microsoft.com/office/drawing/2014/main" id="{E4F25FBA-0D5A-429B-AB79-12CDC07A6A03}"/>
-              </a:ext>
-            </a:extLst>
-          </p:cNvPr>
-          <p:cNvSpPr>
-            <a:spLocks noGrp="1"/>
-          </p:cNvSpPr>
-          <p:nvPr>
-            <p:ph idx="1"/>
-          </p:nvPr>
-        </p:nvSpPr>
-        <p:spPr/>
-        <p:txBody>
-          <a:bodyPr>
-            <a:normAutofit/>
-          </a:bodyPr>
-          <a:lstStyle/>
-          <a:p>
-            <a:r>
-              <a:rPr lang="en-US" dirty="0"/>
-              <a:t>HR Manger:</a:t>
-            </a:r>
-          </a:p>
-          <a:p>
-            <a:pPr marL="0" indent="0">
-              <a:buNone/>
-            </a:pPr>
-            <a:endParaRPr lang="en-US" dirty="0"/>
-          </a:p>
-          <a:p>
-            <a:pPr lvl="1" fontAlgn="base"/>
-            <a:r>
-              <a:rPr lang="en-US" dirty="0"/>
-              <a:t>Recruits, interviews, hires, and trains new staff in the company.</a:t>
-            </a:r>
-          </a:p>
-          <a:p>
-            <a:pPr lvl="1" fontAlgn="base"/>
-            <a:r>
-              <a:rPr lang="en-US" dirty="0"/>
-              <a:t>Oversees the daily workflow of the company.</a:t>
-            </a:r>
-          </a:p>
-          <a:p>
-            <a:pPr lvl="1" fontAlgn="base"/>
-            <a:r>
-              <a:rPr lang="en-US" dirty="0"/>
-              <a:t>Provides constructive and timely performance evaluations.</a:t>
-            </a:r>
-          </a:p>
-          <a:p>
-            <a:pPr lvl="1" fontAlgn="base"/>
-            <a:r>
-              <a:rPr lang="en-US" dirty="0"/>
-              <a:t>Handles discipline and termination of employees in accordance with company policy.</a:t>
-            </a:r>
-          </a:p>
-          <a:p>
-            <a:pPr lvl="1" fontAlgn="base"/>
-            <a:r>
-              <a:rPr lang="en-US" dirty="0"/>
-              <a:t>Reports to general manager</a:t>
-            </a:r>
-          </a:p>
-          <a:p>
-            <a:pPr lvl="1"/>
-            <a:endParaRPr lang="en-US" dirty="0"/>
-          </a:p>
-        </p:txBody>
-      </p:sp>
-    </p:spTree>
-    <p:extLst>
-      <p:ext uri="{BB962C8B-B14F-4D97-AF65-F5344CB8AC3E}">
-        <p14:creationId xmlns:p14="http://schemas.microsoft.com/office/powerpoint/2010/main" val="909828830"/>
-      </p:ext>
-    </p:extLst>
-  </p:cSld>
-  <p:clrMapOvr>
-    <a:masterClrMapping/>
-  </p:clrMapOvr>
-</p:sld>
-</file>
-
-<file path=ppt/slides/slide12.xml><?xml version="1.0" encoding="utf-8"?>
-<p:sld xmlns:a="http://schemas.openxmlformats.org/drawingml/2006/main" xmlns:r="http://schemas.openxmlformats.org/officeDocument/2006/relationships" xmlns:p="http://schemas.openxmlformats.org/presentationml/2006/main">
-  <p:cSld>
-    <p:spTree>
-      <p:nvGrpSpPr>
-        <p:cNvPr id="1" name=""/>
-        <p:cNvGrpSpPr/>
-        <p:nvPr/>
-      </p:nvGrpSpPr>
-      <p:grpSpPr>
-        <a:xfrm>
-          <a:off x="0" y="0"/>
-          <a:ext cx="0" cy="0"/>
-          <a:chOff x="0" y="0"/>
-          <a:chExt cx="0" cy="0"/>
-        </a:xfrm>
-      </p:grpSpPr>
-      <p:sp>
-        <p:nvSpPr>
-          <p:cNvPr id="2" name="Title 1">
-            <a:extLst>
-              <a:ext uri="{FF2B5EF4-FFF2-40B4-BE49-F238E27FC236}">
-                <a16:creationId xmlns:a16="http://schemas.microsoft.com/office/drawing/2014/main" id="{14E9B6F6-46E4-4248-AA02-2742A961F49B}"/>
-              </a:ext>
-            </a:extLst>
-          </p:cNvPr>
-          <p:cNvSpPr>
-            <a:spLocks noGrp="1"/>
-          </p:cNvSpPr>
-          <p:nvPr>
-            <p:ph type="title"/>
-          </p:nvPr>
-        </p:nvSpPr>
-        <p:spPr/>
-        <p:txBody>
-          <a:bodyPr/>
-          <a:lstStyle/>
-          <a:p>
-            <a:r>
-              <a:rPr lang="en-US" dirty="0"/>
-              <a:t>JOB DESCRIPTION </a:t>
-            </a:r>
-          </a:p>
-        </p:txBody>
-      </p:sp>
-      <p:sp>
-        <p:nvSpPr>
-          <p:cNvPr id="3" name="Content Placeholder 2">
-            <a:extLst>
-              <a:ext uri="{FF2B5EF4-FFF2-40B4-BE49-F238E27FC236}">
-                <a16:creationId xmlns:a16="http://schemas.microsoft.com/office/drawing/2014/main" id="{E4F25FBA-0D5A-429B-AB79-12CDC07A6A03}"/>
-              </a:ext>
-            </a:extLst>
-          </p:cNvPr>
-          <p:cNvSpPr>
-            <a:spLocks noGrp="1"/>
-          </p:cNvSpPr>
-          <p:nvPr>
-            <p:ph idx="1"/>
-          </p:nvPr>
-        </p:nvSpPr>
-        <p:spPr/>
-        <p:txBody>
-          <a:bodyPr>
-            <a:normAutofit/>
-          </a:bodyPr>
-          <a:lstStyle/>
-          <a:p>
-            <a:r>
-              <a:rPr lang="en-US" dirty="0"/>
-              <a:t>Customer care:</a:t>
-            </a:r>
-          </a:p>
-          <a:p>
-            <a:pPr lvl="1" fontAlgn="base"/>
-            <a:endParaRPr lang="en-US" dirty="0"/>
-          </a:p>
-          <a:p>
-            <a:pPr lvl="1"/>
-            <a:r>
-              <a:rPr lang="en-US" dirty="0"/>
-              <a:t>Providing customers with what they want</a:t>
-            </a:r>
-          </a:p>
-          <a:p>
-            <a:pPr lvl="1"/>
-            <a:r>
-              <a:rPr lang="en-US" dirty="0"/>
-              <a:t>Offering consistent levels of service</a:t>
-            </a:r>
-          </a:p>
-          <a:p>
-            <a:pPr lvl="1"/>
-            <a:r>
-              <a:rPr lang="en-US" dirty="0"/>
-              <a:t>Exceeding and not just meeting expectations of our customers</a:t>
-            </a:r>
-          </a:p>
-          <a:p>
-            <a:pPr lvl="1"/>
-            <a:r>
-              <a:rPr lang="en-US" dirty="0"/>
-              <a:t>Answering and provide solutions to customers’ concerns about our products</a:t>
-            </a:r>
-          </a:p>
-          <a:p>
-            <a:pPr lvl="1"/>
-            <a:r>
-              <a:rPr lang="en-US" dirty="0"/>
-              <a:t>Going out of your way to delight customers. </a:t>
-            </a:r>
-          </a:p>
-          <a:p>
-            <a:pPr lvl="1"/>
-            <a:r>
-              <a:rPr lang="en-US" dirty="0"/>
-              <a:t>Report issues and complaint to the marketing manager.</a:t>
-            </a:r>
-          </a:p>
-        </p:txBody>
-      </p:sp>
-    </p:spTree>
-    <p:extLst>
-      <p:ext uri="{BB962C8B-B14F-4D97-AF65-F5344CB8AC3E}">
-        <p14:creationId xmlns:p14="http://schemas.microsoft.com/office/powerpoint/2010/main" val="3820423698"/>
-      </p:ext>
-    </p:extLst>
-  </p:cSld>
-  <p:clrMapOvr>
-    <a:masterClrMapping/>
-  </p:clrMapOvr>
-</p:sld>
-</file>
-
-<file path=ppt/slides/slide13.xml><?xml version="1.0" encoding="utf-8"?>
-<p:sld xmlns:a="http://schemas.openxmlformats.org/drawingml/2006/main" xmlns:r="http://schemas.openxmlformats.org/officeDocument/2006/relationships" xmlns:p="http://schemas.openxmlformats.org/presentationml/2006/main">
-  <p:cSld>
-    <p:spTree>
-      <p:nvGrpSpPr>
-        <p:cNvPr id="1" name=""/>
-        <p:cNvGrpSpPr/>
-        <p:nvPr/>
-      </p:nvGrpSpPr>
-      <p:grpSpPr>
-        <a:xfrm>
-          <a:off x="0" y="0"/>
-          <a:ext cx="0" cy="0"/>
-          <a:chOff x="0" y="0"/>
-          <a:chExt cx="0" cy="0"/>
-        </a:xfrm>
-      </p:grpSpPr>
-      <p:sp>
-        <p:nvSpPr>
-          <p:cNvPr id="2" name="Title 1">
-            <a:extLst>
-              <a:ext uri="{FF2B5EF4-FFF2-40B4-BE49-F238E27FC236}">
-                <a16:creationId xmlns:a16="http://schemas.microsoft.com/office/drawing/2014/main" id="{DA286F5F-E00C-4F88-BDE8-5B594276218B}"/>
-              </a:ext>
-            </a:extLst>
-          </p:cNvPr>
-          <p:cNvSpPr>
-            <a:spLocks noGrp="1"/>
-          </p:cNvSpPr>
-          <p:nvPr>
-            <p:ph type="title"/>
-          </p:nvPr>
-        </p:nvSpPr>
-        <p:spPr/>
-        <p:txBody>
-          <a:bodyPr/>
-          <a:lstStyle/>
-          <a:p>
-            <a:r>
-              <a:rPr lang="en-US" dirty="0"/>
-              <a:t>Three cases have occurred as such</a:t>
-            </a:r>
-          </a:p>
-        </p:txBody>
-      </p:sp>
-      <p:sp>
-        <p:nvSpPr>
-          <p:cNvPr id="3" name="Content Placeholder 2">
-            <a:extLst>
-              <a:ext uri="{FF2B5EF4-FFF2-40B4-BE49-F238E27FC236}">
-                <a16:creationId xmlns:a16="http://schemas.microsoft.com/office/drawing/2014/main" id="{D7AE98F3-6D88-4BC9-82D9-D22737592C5C}"/>
-              </a:ext>
-            </a:extLst>
-          </p:cNvPr>
-          <p:cNvSpPr>
-            <a:spLocks noGrp="1"/>
-          </p:cNvSpPr>
-          <p:nvPr>
-            <p:ph idx="1"/>
-          </p:nvPr>
-        </p:nvSpPr>
-        <p:spPr>
-          <a:xfrm>
-            <a:off x="838200" y="1825625"/>
-            <a:ext cx="10515600" cy="1603375"/>
-          </a:xfrm>
-        </p:spPr>
-        <p:txBody>
-          <a:bodyPr/>
-          <a:lstStyle/>
-          <a:p>
-            <a:r>
-              <a:rPr lang="en-US" dirty="0"/>
-              <a:t>An expired product was found on a sale point</a:t>
-            </a:r>
-          </a:p>
-          <a:p>
-            <a:r>
-              <a:rPr lang="en-US" dirty="0"/>
-              <a:t>A child was poisoned eating Yummy meal.</a:t>
-            </a:r>
-          </a:p>
-          <a:p>
-            <a:r>
-              <a:rPr lang="en-US" dirty="0"/>
-              <a:t>Prices of Goat milk has risen on the market.</a:t>
-            </a:r>
-          </a:p>
-        </p:txBody>
-      </p:sp>
-    </p:spTree>
-    <p:extLst>
-      <p:ext uri="{BB962C8B-B14F-4D97-AF65-F5344CB8AC3E}">
-        <p14:creationId xmlns:p14="http://schemas.microsoft.com/office/powerpoint/2010/main" val="3828211854"/>
-      </p:ext>
-    </p:extLst>
-  </p:cSld>
-  <p:clrMapOvr>
-    <a:masterClrMapping/>
-  </p:clrMapOvr>
-</p:sld>
-</file>
-
-<file path=ppt/slides/slide14.xml><?xml version="1.0" encoding="utf-8"?>
-<p:sld xmlns:a="http://schemas.openxmlformats.org/drawingml/2006/main" xmlns:r="http://schemas.openxmlformats.org/officeDocument/2006/relationships" xmlns:p="http://schemas.openxmlformats.org/presentationml/2006/main">
-  <p:cSld>
-    <p:spTree>
-      <p:nvGrpSpPr>
-        <p:cNvPr id="1" name=""/>
-        <p:cNvGrpSpPr/>
-        <p:nvPr/>
-      </p:nvGrpSpPr>
-      <p:grpSpPr>
-        <a:xfrm>
-          <a:off x="0" y="0"/>
-          <a:ext cx="0" cy="0"/>
-          <a:chOff x="0" y="0"/>
-          <a:chExt cx="0" cy="0"/>
-        </a:xfrm>
-      </p:grpSpPr>
-      <p:sp>
-        <p:nvSpPr>
-          <p:cNvPr id="2" name="Title 1">
-            <a:extLst>
-              <a:ext uri="{FF2B5EF4-FFF2-40B4-BE49-F238E27FC236}">
-                <a16:creationId xmlns:a16="http://schemas.microsoft.com/office/drawing/2014/main" id="{DA286F5F-E00C-4F88-BDE8-5B594276218B}"/>
-              </a:ext>
-            </a:extLst>
-          </p:cNvPr>
-          <p:cNvSpPr>
-            <a:spLocks noGrp="1"/>
-          </p:cNvSpPr>
-          <p:nvPr>
-            <p:ph type="title"/>
-          </p:nvPr>
-        </p:nvSpPr>
-        <p:spPr/>
-        <p:txBody>
-          <a:bodyPr>
-            <a:normAutofit fontScale="90000"/>
-          </a:bodyPr>
-          <a:lstStyle/>
-          <a:p>
-            <a:r>
-              <a:rPr lang="en-US" dirty="0"/>
-              <a:t>Cases 1:</a:t>
-            </a:r>
-            <a:br>
-              <a:rPr lang="en-US" dirty="0"/>
-            </a:br>
-            <a:r>
-              <a:rPr lang="en-US" dirty="0"/>
-              <a:t>An expired product was found on a sale point</a:t>
-            </a:r>
-            <a:br>
-              <a:rPr lang="en-US" dirty="0"/>
-            </a:br>
-            <a:endParaRPr lang="en-US" dirty="0"/>
-          </a:p>
-        </p:txBody>
-      </p:sp>
-      <p:sp>
-        <p:nvSpPr>
-          <p:cNvPr id="3" name="Content Placeholder 2">
-            <a:extLst>
-              <a:ext uri="{FF2B5EF4-FFF2-40B4-BE49-F238E27FC236}">
-                <a16:creationId xmlns:a16="http://schemas.microsoft.com/office/drawing/2014/main" id="{D7AE98F3-6D88-4BC9-82D9-D22737592C5C}"/>
-              </a:ext>
-            </a:extLst>
-          </p:cNvPr>
-          <p:cNvSpPr>
-            <a:spLocks noGrp="1"/>
-          </p:cNvSpPr>
-          <p:nvPr>
-            <p:ph idx="1"/>
-          </p:nvPr>
-        </p:nvSpPr>
-        <p:spPr>
-          <a:xfrm>
-            <a:off x="838200" y="1825624"/>
-            <a:ext cx="10515600" cy="4098657"/>
-          </a:xfrm>
-        </p:spPr>
-        <p:txBody>
-          <a:bodyPr>
-            <a:normAutofit lnSpcReduction="10000"/>
-          </a:bodyPr>
-          <a:lstStyle/>
-          <a:p>
-            <a:r>
-              <a:rPr lang="en-US" dirty="0"/>
-              <a:t>Our customer care received a call from a customer complaining about an expired product on market.</a:t>
-            </a:r>
-          </a:p>
-          <a:p>
-            <a:r>
-              <a:rPr lang="en-US" dirty="0"/>
-              <a:t>Our customer care have reported to the marketing manager.</a:t>
-            </a:r>
-          </a:p>
-          <a:p>
-            <a:r>
-              <a:rPr lang="en-US" dirty="0"/>
-              <a:t>Our sales team check the expired dates of all products, report and replace expired ones.</a:t>
-            </a:r>
-          </a:p>
-          <a:p>
-            <a:r>
-              <a:rPr lang="en-US" dirty="0"/>
-              <a:t>There was no report found regarding an expired product.</a:t>
-            </a:r>
-          </a:p>
-          <a:p>
-            <a:r>
-              <a:rPr lang="en-US" dirty="0"/>
-              <a:t>The marketing manager reports to the supply chain manager.</a:t>
-            </a:r>
-          </a:p>
-          <a:p>
-            <a:r>
-              <a:rPr lang="en-US" dirty="0"/>
-              <a:t>Supply chain manager reports to the general Manager and CC to the legal counsel. </a:t>
-            </a:r>
-          </a:p>
-          <a:p>
-            <a:endParaRPr lang="en-US" dirty="0"/>
-          </a:p>
-          <a:p>
-            <a:endParaRPr lang="en-US" dirty="0"/>
-          </a:p>
-          <a:p>
-            <a:endParaRPr lang="en-US" dirty="0"/>
-          </a:p>
-        </p:txBody>
-      </p:sp>
-    </p:spTree>
-    <p:extLst>
-      <p:ext uri="{BB962C8B-B14F-4D97-AF65-F5344CB8AC3E}">
-        <p14:creationId xmlns:p14="http://schemas.microsoft.com/office/powerpoint/2010/main" val="1188507269"/>
-      </p:ext>
-    </p:extLst>
-  </p:cSld>
-  <p:clrMapOvr>
-    <a:masterClrMapping/>
-  </p:clrMapOvr>
-</p:sld>
-</file>
-
-<file path=ppt/slides/slide15.xml><?xml version="1.0" encoding="utf-8"?>
-<p:sld xmlns:a="http://schemas.openxmlformats.org/drawingml/2006/main" xmlns:r="http://schemas.openxmlformats.org/officeDocument/2006/relationships" xmlns:p="http://schemas.openxmlformats.org/presentationml/2006/main">
-  <p:cSld>
-    <p:spTree>
-      <p:nvGrpSpPr>
-        <p:cNvPr id="1" name=""/>
-        <p:cNvGrpSpPr/>
-        <p:nvPr/>
-      </p:nvGrpSpPr>
-      <p:grpSpPr>
-        <a:xfrm>
-          <a:off x="0" y="0"/>
-          <a:ext cx="0" cy="0"/>
-          <a:chOff x="0" y="0"/>
-          <a:chExt cx="0" cy="0"/>
-        </a:xfrm>
-      </p:grpSpPr>
-      <p:sp>
-        <p:nvSpPr>
-          <p:cNvPr id="2" name="Title 1">
-            <a:extLst>
-              <a:ext uri="{FF2B5EF4-FFF2-40B4-BE49-F238E27FC236}">
-                <a16:creationId xmlns:a16="http://schemas.microsoft.com/office/drawing/2014/main" id="{DA286F5F-E00C-4F88-BDE8-5B594276218B}"/>
-              </a:ext>
-            </a:extLst>
-          </p:cNvPr>
-          <p:cNvSpPr>
-            <a:spLocks noGrp="1"/>
-          </p:cNvSpPr>
-          <p:nvPr>
-            <p:ph type="title"/>
-          </p:nvPr>
-        </p:nvSpPr>
-        <p:spPr/>
-        <p:txBody>
-          <a:bodyPr>
-            <a:normAutofit fontScale="90000"/>
-          </a:bodyPr>
-          <a:lstStyle/>
-          <a:p>
-            <a:r>
-              <a:rPr lang="en-US" dirty="0"/>
-              <a:t>Cases 2:</a:t>
-            </a:r>
-            <a:br>
-              <a:rPr lang="en-US" dirty="0"/>
-            </a:br>
-            <a:r>
-              <a:rPr lang="en-US" dirty="0"/>
-              <a:t>A child was poisoned eating Yummy meal.</a:t>
-            </a:r>
-            <a:br>
-              <a:rPr lang="en-US" dirty="0"/>
-            </a:br>
-            <a:endParaRPr lang="en-US" dirty="0"/>
-          </a:p>
-        </p:txBody>
-      </p:sp>
-      <p:sp>
-        <p:nvSpPr>
-          <p:cNvPr id="3" name="Content Placeholder 2">
-            <a:extLst>
-              <a:ext uri="{FF2B5EF4-FFF2-40B4-BE49-F238E27FC236}">
-                <a16:creationId xmlns:a16="http://schemas.microsoft.com/office/drawing/2014/main" id="{D7AE98F3-6D88-4BC9-82D9-D22737592C5C}"/>
-              </a:ext>
-            </a:extLst>
-          </p:cNvPr>
-          <p:cNvSpPr>
-            <a:spLocks noGrp="1"/>
-          </p:cNvSpPr>
-          <p:nvPr>
-            <p:ph idx="1"/>
-          </p:nvPr>
-        </p:nvSpPr>
-        <p:spPr>
-          <a:xfrm>
-            <a:off x="838200" y="1825625"/>
-            <a:ext cx="10515600" cy="3860800"/>
-          </a:xfrm>
-        </p:spPr>
-        <p:txBody>
-          <a:bodyPr>
-            <a:normAutofit/>
-          </a:bodyPr>
-          <a:lstStyle/>
-          <a:p>
-            <a:r>
-              <a:rPr lang="en-US" dirty="0"/>
-              <a:t>A customer reached our customer care’s office and complained that her child was poisoned by eating a Yummy meal and willing to sue the company.</a:t>
-            </a:r>
-          </a:p>
-          <a:p>
-            <a:r>
-              <a:rPr lang="en-US" dirty="0"/>
-              <a:t>Our customer care told the customer to calm down and have reported the issue to the marketing manager.</a:t>
-            </a:r>
-          </a:p>
-          <a:p>
-            <a:r>
-              <a:rPr lang="en-US" dirty="0"/>
-              <a:t>Marketing manager reports to the supply chain manager.</a:t>
-            </a:r>
-          </a:p>
-          <a:p>
-            <a:r>
-              <a:rPr lang="en-US" dirty="0"/>
-              <a:t> the supply chain manager reports to the general Manager and CC to the legal counsel. </a:t>
-            </a:r>
-          </a:p>
-          <a:p>
-            <a:endParaRPr lang="en-US" dirty="0"/>
-          </a:p>
-        </p:txBody>
-      </p:sp>
-    </p:spTree>
-    <p:extLst>
-      <p:ext uri="{BB962C8B-B14F-4D97-AF65-F5344CB8AC3E}">
-        <p14:creationId xmlns:p14="http://schemas.microsoft.com/office/powerpoint/2010/main" val="896641525"/>
-      </p:ext>
-    </p:extLst>
-  </p:cSld>
-  <p:clrMapOvr>
-    <a:masterClrMapping/>
-  </p:clrMapOvr>
-</p:sld>
-</file>
-
-<file path=ppt/slides/slide2.xml><?xml version="1.0" encoding="utf-8"?>
+<file path=ppt/slides/slide3.xml><?xml version="1.0" encoding="utf-8"?>
 <p:sld xmlns:a="http://schemas.openxmlformats.org/drawingml/2006/main" xmlns:r="http://schemas.openxmlformats.org/officeDocument/2006/relationships" xmlns:p="http://schemas.openxmlformats.org/presentationml/2006/main">
   <p:cSld>
     <p:spTree>
@@ -12186,7 +12426,7 @@
 </p:sld>
 </file>
 
-<file path=ppt/slides/slide3.xml><?xml version="1.0" encoding="utf-8"?>
+<file path=ppt/slides/slide4.xml><?xml version="1.0" encoding="utf-8"?>
 <p:sld xmlns:a="http://schemas.openxmlformats.org/drawingml/2006/main" xmlns:r="http://schemas.openxmlformats.org/officeDocument/2006/relationships" xmlns:p="http://schemas.openxmlformats.org/presentationml/2006/main">
   <p:cSld>
     <p:spTree>
@@ -12311,7 +12551,7 @@
 </p:sld>
 </file>
 
-<file path=ppt/slides/slide4.xml><?xml version="1.0" encoding="utf-8"?>
+<file path=ppt/slides/slide5.xml><?xml version="1.0" encoding="utf-8"?>
 <p:sld xmlns:a="http://schemas.openxmlformats.org/drawingml/2006/main" xmlns:r="http://schemas.openxmlformats.org/officeDocument/2006/relationships" xmlns:p="http://schemas.openxmlformats.org/presentationml/2006/main">
   <p:cSld>
     <p:spTree>
@@ -12405,157 +12645,6 @@
 </p:sld>
 </file>
 
-<file path=ppt/slides/slide5.xml><?xml version="1.0" encoding="utf-8"?>
-<p:sld xmlns:a="http://schemas.openxmlformats.org/drawingml/2006/main" xmlns:r="http://schemas.openxmlformats.org/officeDocument/2006/relationships" xmlns:p="http://schemas.openxmlformats.org/presentationml/2006/main">
-  <p:cSld>
-    <p:spTree>
-      <p:nvGrpSpPr>
-        <p:cNvPr id="1" name=""/>
-        <p:cNvGrpSpPr/>
-        <p:nvPr/>
-      </p:nvGrpSpPr>
-      <p:grpSpPr>
-        <a:xfrm>
-          <a:off x="0" y="0"/>
-          <a:ext cx="0" cy="0"/>
-          <a:chOff x="0" y="0"/>
-          <a:chExt cx="0" cy="0"/>
-        </a:xfrm>
-      </p:grpSpPr>
-      <p:sp>
-        <p:nvSpPr>
-          <p:cNvPr id="2" name="Title 1">
-            <a:extLst>
-              <a:ext uri="{FF2B5EF4-FFF2-40B4-BE49-F238E27FC236}">
-                <a16:creationId xmlns:a16="http://schemas.microsoft.com/office/drawing/2014/main" id="{14E9B6F6-46E4-4248-AA02-2742A961F49B}"/>
-              </a:ext>
-            </a:extLst>
-          </p:cNvPr>
-          <p:cNvSpPr>
-            <a:spLocks noGrp="1"/>
-          </p:cNvSpPr>
-          <p:nvPr>
-            <p:ph type="title"/>
-          </p:nvPr>
-        </p:nvSpPr>
-        <p:spPr/>
-        <p:txBody>
-          <a:bodyPr/>
-          <a:lstStyle/>
-          <a:p>
-            <a:r>
-              <a:rPr lang="en-US" dirty="0"/>
-              <a:t>JOB DESCRIPTION </a:t>
-            </a:r>
-          </a:p>
-        </p:txBody>
-      </p:sp>
-      <p:sp>
-        <p:nvSpPr>
-          <p:cNvPr id="3" name="Content Placeholder 2">
-            <a:extLst>
-              <a:ext uri="{FF2B5EF4-FFF2-40B4-BE49-F238E27FC236}">
-                <a16:creationId xmlns:a16="http://schemas.microsoft.com/office/drawing/2014/main" id="{E4F25FBA-0D5A-429B-AB79-12CDC07A6A03}"/>
-              </a:ext>
-            </a:extLst>
-          </p:cNvPr>
-          <p:cNvSpPr>
-            <a:spLocks noGrp="1"/>
-          </p:cNvSpPr>
-          <p:nvPr>
-            <p:ph idx="1"/>
-          </p:nvPr>
-        </p:nvSpPr>
-        <p:spPr>
-          <a:xfrm>
-            <a:off x="823912" y="1854201"/>
-            <a:ext cx="10515600" cy="4351338"/>
-          </a:xfrm>
-        </p:spPr>
-        <p:txBody>
-          <a:bodyPr>
-            <a:normAutofit/>
-          </a:bodyPr>
-          <a:lstStyle/>
-          <a:p>
-            <a:r>
-              <a:rPr lang="en-US" dirty="0"/>
-              <a:t>General Manager:</a:t>
-            </a:r>
-          </a:p>
-          <a:p>
-            <a:pPr marL="0" indent="0">
-              <a:buNone/>
-            </a:pPr>
-            <a:endParaRPr lang="en-US" dirty="0"/>
-          </a:p>
-          <a:p>
-            <a:pPr lvl="1" fontAlgn="base"/>
-            <a:r>
-              <a:rPr lang="en-US" dirty="0"/>
-              <a:t>Plan and implement the overall company strategy.</a:t>
-            </a:r>
-          </a:p>
-          <a:p>
-            <a:pPr lvl="1" fontAlgn="base"/>
-            <a:r>
-              <a:rPr lang="en-US" dirty="0"/>
-              <a:t>Determine budget and procurement.</a:t>
-            </a:r>
-          </a:p>
-          <a:p>
-            <a:pPr lvl="1" fontAlgn="base"/>
-            <a:r>
-              <a:rPr lang="en-US" dirty="0"/>
-              <a:t>Recruit the company team.</a:t>
-            </a:r>
-          </a:p>
-          <a:p>
-            <a:pPr lvl="1" fontAlgn="base"/>
-            <a:r>
-              <a:rPr lang="en-US" dirty="0"/>
-              <a:t>Lead the company team to meet company’s policy and ensure good public relationships.</a:t>
-            </a:r>
-          </a:p>
-          <a:p>
-            <a:pPr lvl="1" fontAlgn="base"/>
-            <a:r>
-              <a:rPr lang="en-US" dirty="0"/>
-              <a:t>Determine overall KPIs.</a:t>
-            </a:r>
-          </a:p>
-          <a:p>
-            <a:pPr lvl="1" fontAlgn="base"/>
-            <a:r>
-              <a:rPr lang="en-US" dirty="0"/>
-              <a:t>Train and evaluate the company team.</a:t>
-            </a:r>
-          </a:p>
-          <a:p>
-            <a:pPr marL="457200" lvl="1" indent="0">
-              <a:buNone/>
-            </a:pPr>
-            <a:endParaRPr lang="en-US" dirty="0"/>
-          </a:p>
-          <a:p>
-            <a:pPr lvl="1"/>
-            <a:endParaRPr lang="en-US" dirty="0"/>
-          </a:p>
-        </p:txBody>
-      </p:sp>
-    </p:spTree>
-    <p:extLst>
-      <p:ext uri="{BB962C8B-B14F-4D97-AF65-F5344CB8AC3E}">
-        <p14:creationId xmlns:p14="http://schemas.microsoft.com/office/powerpoint/2010/main" val="2585032853"/>
-      </p:ext>
-    </p:extLst>
-  </p:cSld>
-  <p:clrMapOvr>
-    <a:masterClrMapping/>
-  </p:clrMapOvr>
-</p:sld>
-</file>
-
 <file path=ppt/slides/slide6.xml><?xml version="1.0" encoding="utf-8"?>
 <p:sld xmlns:a="http://schemas.openxmlformats.org/drawingml/2006/main" xmlns:r="http://schemas.openxmlformats.org/officeDocument/2006/relationships" xmlns:p="http://schemas.openxmlformats.org/presentationml/2006/main">
   <p:cSld>
@@ -12617,6 +12706,157 @@
             <p:ph idx="1"/>
           </p:nvPr>
         </p:nvSpPr>
+        <p:spPr>
+          <a:xfrm>
+            <a:off x="823912" y="1854201"/>
+            <a:ext cx="10515600" cy="4351338"/>
+          </a:xfrm>
+        </p:spPr>
+        <p:txBody>
+          <a:bodyPr>
+            <a:normAutofit/>
+          </a:bodyPr>
+          <a:lstStyle/>
+          <a:p>
+            <a:r>
+              <a:rPr lang="en-US" dirty="0"/>
+              <a:t>General Manager:</a:t>
+            </a:r>
+          </a:p>
+          <a:p>
+            <a:pPr marL="0" indent="0">
+              <a:buNone/>
+            </a:pPr>
+            <a:endParaRPr lang="en-US" dirty="0"/>
+          </a:p>
+          <a:p>
+            <a:pPr lvl="1" fontAlgn="base"/>
+            <a:r>
+              <a:rPr lang="en-US" dirty="0"/>
+              <a:t>Plan and implement the overall company strategy.</a:t>
+            </a:r>
+          </a:p>
+          <a:p>
+            <a:pPr lvl="1" fontAlgn="base"/>
+            <a:r>
+              <a:rPr lang="en-US" dirty="0"/>
+              <a:t>Determine budget and procurement.</a:t>
+            </a:r>
+          </a:p>
+          <a:p>
+            <a:pPr lvl="1" fontAlgn="base"/>
+            <a:r>
+              <a:rPr lang="en-US" dirty="0"/>
+              <a:t>Recruit the company team.</a:t>
+            </a:r>
+          </a:p>
+          <a:p>
+            <a:pPr lvl="1" fontAlgn="base"/>
+            <a:r>
+              <a:rPr lang="en-US" dirty="0"/>
+              <a:t>Lead the company team to meet company’s policy and ensure good public relationships.</a:t>
+            </a:r>
+          </a:p>
+          <a:p>
+            <a:pPr lvl="1" fontAlgn="base"/>
+            <a:r>
+              <a:rPr lang="en-US" dirty="0"/>
+              <a:t>Determine overall KPIs.</a:t>
+            </a:r>
+          </a:p>
+          <a:p>
+            <a:pPr lvl="1" fontAlgn="base"/>
+            <a:r>
+              <a:rPr lang="en-US" dirty="0"/>
+              <a:t>Train and evaluate the company team.</a:t>
+            </a:r>
+          </a:p>
+          <a:p>
+            <a:pPr marL="457200" lvl="1" indent="0">
+              <a:buNone/>
+            </a:pPr>
+            <a:endParaRPr lang="en-US" dirty="0"/>
+          </a:p>
+          <a:p>
+            <a:pPr lvl="1"/>
+            <a:endParaRPr lang="en-US" dirty="0"/>
+          </a:p>
+        </p:txBody>
+      </p:sp>
+    </p:spTree>
+    <p:extLst>
+      <p:ext uri="{BB962C8B-B14F-4D97-AF65-F5344CB8AC3E}">
+        <p14:creationId xmlns:p14="http://schemas.microsoft.com/office/powerpoint/2010/main" val="2585032853"/>
+      </p:ext>
+    </p:extLst>
+  </p:cSld>
+  <p:clrMapOvr>
+    <a:masterClrMapping/>
+  </p:clrMapOvr>
+</p:sld>
+</file>
+
+<file path=ppt/slides/slide7.xml><?xml version="1.0" encoding="utf-8"?>
+<p:sld xmlns:a="http://schemas.openxmlformats.org/drawingml/2006/main" xmlns:r="http://schemas.openxmlformats.org/officeDocument/2006/relationships" xmlns:p="http://schemas.openxmlformats.org/presentationml/2006/main">
+  <p:cSld>
+    <p:spTree>
+      <p:nvGrpSpPr>
+        <p:cNvPr id="1" name=""/>
+        <p:cNvGrpSpPr/>
+        <p:nvPr/>
+      </p:nvGrpSpPr>
+      <p:grpSpPr>
+        <a:xfrm>
+          <a:off x="0" y="0"/>
+          <a:ext cx="0" cy="0"/>
+          <a:chOff x="0" y="0"/>
+          <a:chExt cx="0" cy="0"/>
+        </a:xfrm>
+      </p:grpSpPr>
+      <p:sp>
+        <p:nvSpPr>
+          <p:cNvPr id="2" name="Title 1">
+            <a:extLst>
+              <a:ext uri="{FF2B5EF4-FFF2-40B4-BE49-F238E27FC236}">
+                <a16:creationId xmlns:a16="http://schemas.microsoft.com/office/drawing/2014/main" id="{14E9B6F6-46E4-4248-AA02-2742A961F49B}"/>
+              </a:ext>
+            </a:extLst>
+          </p:cNvPr>
+          <p:cNvSpPr>
+            <a:spLocks noGrp="1"/>
+          </p:cNvSpPr>
+          <p:nvPr>
+            <p:ph type="title"/>
+          </p:nvPr>
+        </p:nvSpPr>
+        <p:spPr/>
+        <p:txBody>
+          <a:bodyPr/>
+          <a:lstStyle/>
+          <a:p>
+            <a:r>
+              <a:rPr lang="en-US" dirty="0"/>
+              <a:t>JOB DESCRIPTION </a:t>
+            </a:r>
+          </a:p>
+        </p:txBody>
+      </p:sp>
+      <p:sp>
+        <p:nvSpPr>
+          <p:cNvPr id="3" name="Content Placeholder 2">
+            <a:extLst>
+              <a:ext uri="{FF2B5EF4-FFF2-40B4-BE49-F238E27FC236}">
+                <a16:creationId xmlns:a16="http://schemas.microsoft.com/office/drawing/2014/main" id="{E4F25FBA-0D5A-429B-AB79-12CDC07A6A03}"/>
+              </a:ext>
+            </a:extLst>
+          </p:cNvPr>
+          <p:cNvSpPr>
+            <a:spLocks noGrp="1"/>
+          </p:cNvSpPr>
+          <p:nvPr>
+            <p:ph idx="1"/>
+          </p:nvPr>
+        </p:nvSpPr>
         <p:spPr/>
         <p:txBody>
           <a:bodyPr>
@@ -12688,7 +12928,7 @@
 </p:sld>
 </file>
 
-<file path=ppt/slides/slide7.xml><?xml version="1.0" encoding="utf-8"?>
+<file path=ppt/slides/slide8.xml><?xml version="1.0" encoding="utf-8"?>
 <p:sld xmlns:a="http://schemas.openxmlformats.org/drawingml/2006/main" xmlns:r="http://schemas.openxmlformats.org/officeDocument/2006/relationships" xmlns:p="http://schemas.openxmlformats.org/presentationml/2006/main">
   <p:cSld>
     <p:spTree>
@@ -12953,159 +13193,6 @@
 </p:sld>
 </file>
 
-<file path=ppt/slides/slide8.xml><?xml version="1.0" encoding="utf-8"?>
-<p:sld xmlns:a="http://schemas.openxmlformats.org/drawingml/2006/main" xmlns:r="http://schemas.openxmlformats.org/officeDocument/2006/relationships" xmlns:p="http://schemas.openxmlformats.org/presentationml/2006/main">
-  <p:cSld>
-    <p:spTree>
-      <p:nvGrpSpPr>
-        <p:cNvPr id="1" name=""/>
-        <p:cNvGrpSpPr/>
-        <p:nvPr/>
-      </p:nvGrpSpPr>
-      <p:grpSpPr>
-        <a:xfrm>
-          <a:off x="0" y="0"/>
-          <a:ext cx="0" cy="0"/>
-          <a:chOff x="0" y="0"/>
-          <a:chExt cx="0" cy="0"/>
-        </a:xfrm>
-      </p:grpSpPr>
-      <p:sp>
-        <p:nvSpPr>
-          <p:cNvPr id="2" name="Title 1">
-            <a:extLst>
-              <a:ext uri="{FF2B5EF4-FFF2-40B4-BE49-F238E27FC236}">
-                <a16:creationId xmlns:a16="http://schemas.microsoft.com/office/drawing/2014/main" id="{14E9B6F6-46E4-4248-AA02-2742A961F49B}"/>
-              </a:ext>
-            </a:extLst>
-          </p:cNvPr>
-          <p:cNvSpPr>
-            <a:spLocks noGrp="1"/>
-          </p:cNvSpPr>
-          <p:nvPr>
-            <p:ph type="title"/>
-          </p:nvPr>
-        </p:nvSpPr>
-        <p:spPr/>
-        <p:txBody>
-          <a:bodyPr/>
-          <a:lstStyle/>
-          <a:p>
-            <a:r>
-              <a:rPr lang="en-US" dirty="0"/>
-              <a:t>JOB DESCRIPTION </a:t>
-            </a:r>
-          </a:p>
-        </p:txBody>
-      </p:sp>
-      <p:sp>
-        <p:nvSpPr>
-          <p:cNvPr id="3" name="Content Placeholder 2">
-            <a:extLst>
-              <a:ext uri="{FF2B5EF4-FFF2-40B4-BE49-F238E27FC236}">
-                <a16:creationId xmlns:a16="http://schemas.microsoft.com/office/drawing/2014/main" id="{E4F25FBA-0D5A-429B-AB79-12CDC07A6A03}"/>
-              </a:ext>
-            </a:extLst>
-          </p:cNvPr>
-          <p:cNvSpPr>
-            <a:spLocks noGrp="1"/>
-          </p:cNvSpPr>
-          <p:nvPr>
-            <p:ph idx="1"/>
-          </p:nvPr>
-        </p:nvSpPr>
-        <p:spPr/>
-        <p:txBody>
-          <a:bodyPr>
-            <a:normAutofit/>
-          </a:bodyPr>
-          <a:lstStyle/>
-          <a:p>
-            <a:r>
-              <a:rPr lang="en-US" dirty="0"/>
-              <a:t>Supply Chain manager:</a:t>
-            </a:r>
-          </a:p>
-          <a:p>
-            <a:pPr marL="0" indent="0">
-              <a:buNone/>
-            </a:pPr>
-            <a:endParaRPr lang="en-US" dirty="0"/>
-          </a:p>
-          <a:p>
-            <a:pPr lvl="1" fontAlgn="base"/>
-            <a:r>
-              <a:rPr lang="en-US" dirty="0"/>
-              <a:t>Plan and implement the overall supply chain strategy</a:t>
-            </a:r>
-          </a:p>
-          <a:p>
-            <a:pPr lvl="1" fontAlgn="base"/>
-            <a:r>
-              <a:rPr lang="en-US" dirty="0"/>
-              <a:t>Lead the production, Sales, and Customer Service teams  to determine best vendors and distributors.</a:t>
-            </a:r>
-          </a:p>
-          <a:p>
-            <a:pPr lvl="1" fontAlgn="base"/>
-            <a:r>
-              <a:rPr lang="en-US" dirty="0"/>
-              <a:t>Determine key supply chain KPIs</a:t>
-            </a:r>
-          </a:p>
-          <a:p>
-            <a:pPr lvl="1" fontAlgn="base"/>
-            <a:r>
-              <a:rPr lang="en-US" dirty="0"/>
-              <a:t>Suggest solutions for process improvements</a:t>
-            </a:r>
-          </a:p>
-          <a:p>
-            <a:pPr lvl="1" fontAlgn="base"/>
-            <a:r>
-              <a:rPr lang="en-US" dirty="0"/>
-              <a:t>Train and evaluate others</a:t>
-            </a:r>
-          </a:p>
-          <a:p>
-            <a:pPr lvl="1" fontAlgn="base"/>
-            <a:r>
-              <a:rPr lang="en-US" dirty="0"/>
-              <a:t>Build and maintain good relationships with vendors</a:t>
-            </a:r>
-          </a:p>
-          <a:p>
-            <a:pPr lvl="1" fontAlgn="base"/>
-            <a:r>
-              <a:rPr lang="en-US" dirty="0"/>
-              <a:t>Reports to General Manager.</a:t>
-            </a:r>
-          </a:p>
-          <a:p>
-            <a:pPr marL="457200" lvl="1" indent="0">
-              <a:buNone/>
-            </a:pPr>
-            <a:endParaRPr lang="en-US" dirty="0"/>
-          </a:p>
-          <a:p>
-            <a:pPr lvl="1"/>
-            <a:endParaRPr lang="en-US" dirty="0"/>
-          </a:p>
-        </p:txBody>
-      </p:sp>
-    </p:spTree>
-    <p:extLst>
-      <p:ext uri="{BB962C8B-B14F-4D97-AF65-F5344CB8AC3E}">
-        <p14:creationId xmlns:p14="http://schemas.microsoft.com/office/powerpoint/2010/main" val="1225173462"/>
-      </p:ext>
-    </p:extLst>
-  </p:cSld>
-  <p:clrMapOvr>
-    <a:masterClrMapping/>
-  </p:clrMapOvr>
-</p:sld>
-</file>
-
 <file path=ppt/slides/slide9.xml><?xml version="1.0" encoding="utf-8"?>
 <p:sld xmlns:a="http://schemas.openxmlformats.org/drawingml/2006/main" xmlns:r="http://schemas.openxmlformats.org/officeDocument/2006/relationships" xmlns:p="http://schemas.openxmlformats.org/presentationml/2006/main">
   <p:cSld>
@@ -13176,7 +13263,7 @@
           <a:p>
             <a:r>
               <a:rPr lang="en-US" dirty="0"/>
-              <a:t>Financial Manager:</a:t>
+              <a:t>Supply Chain manager:</a:t>
             </a:r>
           </a:p>
           <a:p>
@@ -13189,49 +13276,49 @@
             <a:pPr lvl="1" fontAlgn="base"/>
             <a:r>
               <a:rPr lang="en-US" dirty="0"/>
-              <a:t>Plan and implement the overall financial strategy.</a:t>
+              <a:t>Plan and implement the overall supply chain strategy</a:t>
             </a:r>
           </a:p>
           <a:p>
             <a:pPr lvl="1" fontAlgn="base"/>
             <a:r>
               <a:rPr lang="en-US" dirty="0"/>
-              <a:t>Undertaking strategic analysis and assisting with strategic planning </a:t>
+              <a:t>Lead the production, Sales, and Customer Service teams  to determine best vendors and distributors.</a:t>
             </a:r>
           </a:p>
           <a:p>
             <a:pPr lvl="1" fontAlgn="base"/>
             <a:r>
               <a:rPr lang="en-US" dirty="0"/>
-              <a:t>controlling income, cash flow and expenditure.</a:t>
+              <a:t>Determine key supply chain KPIs</a:t>
             </a:r>
           </a:p>
           <a:p>
             <a:pPr lvl="1" fontAlgn="base"/>
             <a:r>
               <a:rPr lang="en-US" dirty="0"/>
-              <a:t>developing and managing financial systems/models</a:t>
+              <a:t>Suggest solutions for process improvements</a:t>
             </a:r>
           </a:p>
           <a:p>
             <a:pPr lvl="1" fontAlgn="base"/>
             <a:r>
               <a:rPr lang="en-US" dirty="0"/>
-              <a:t>managing budgets.</a:t>
+              <a:t>Train and evaluate others</a:t>
             </a:r>
           </a:p>
           <a:p>
             <a:pPr lvl="1" fontAlgn="base"/>
             <a:r>
               <a:rPr lang="en-US" dirty="0"/>
-              <a:t>Lead financial team to achieve plans</a:t>
+              <a:t>Build and maintain good relationships with vendors</a:t>
             </a:r>
           </a:p>
           <a:p>
             <a:pPr lvl="1" fontAlgn="base"/>
             <a:r>
               <a:rPr lang="en-US" dirty="0"/>
-              <a:t>Reports to general manager.</a:t>
+              <a:t>Reports to General Manager.</a:t>
             </a:r>
           </a:p>
           <a:p>
@@ -13249,7 +13336,7 @@
     </p:spTree>
     <p:extLst>
       <p:ext uri="{BB962C8B-B14F-4D97-AF65-F5344CB8AC3E}">
-        <p14:creationId xmlns:p14="http://schemas.microsoft.com/office/powerpoint/2010/main" val="684051136"/>
+        <p14:creationId xmlns:p14="http://schemas.microsoft.com/office/powerpoint/2010/main" val="1225173462"/>
       </p:ext>
     </p:extLst>
   </p:cSld>

</xml_diff>